<commit_message>
system analysis report updated
</commit_message>
<xml_diff>
--- a/Sistem Analizi ve Tasarımı 1. Sunum.pptx
+++ b/Sistem Analizi ve Tasarımı 1. Sunum.pptx
@@ -124,7 +124,7 @@
   </p:defaultTextStyle>
   <p:extLst>
     <p:ext uri="{EFAFB233-063F-42B5-8137-9DF3F51BA10A}">
-      <p15:sldGuideLst xmlns:p15="http://schemas.microsoft.com/office/powerpoint/2012/main" xmlns=""/>
+      <p15:sldGuideLst xmlns="" xmlns:p15="http://schemas.microsoft.com/office/powerpoint/2012/main"/>
     </p:ext>
   </p:extLst>
 </p:presentation>
@@ -7001,63 +7001,63 @@
                 <a:gridCol w="2873860">
                   <a:extLst>
                     <a:ext uri="{9D8B030D-6E8A-4147-A177-3AD203B41FA5}">
-                      <a16:colId xmlns:a16="http://schemas.microsoft.com/office/drawing/2014/main" xmlns="" val="20000"/>
+                      <a16:colId xmlns="" xmlns:a16="http://schemas.microsoft.com/office/drawing/2014/main" val="20000"/>
                     </a:ext>
                   </a:extLst>
                 </a:gridCol>
                 <a:gridCol w="772009">
                   <a:extLst>
                     <a:ext uri="{9D8B030D-6E8A-4147-A177-3AD203B41FA5}">
-                      <a16:colId xmlns:a16="http://schemas.microsoft.com/office/drawing/2014/main" xmlns="" val="20001"/>
+                      <a16:colId xmlns="" xmlns:a16="http://schemas.microsoft.com/office/drawing/2014/main" val="20001"/>
                     </a:ext>
                   </a:extLst>
                 </a:gridCol>
                 <a:gridCol w="772716">
                   <a:extLst>
                     <a:ext uri="{9D8B030D-6E8A-4147-A177-3AD203B41FA5}">
-                      <a16:colId xmlns:a16="http://schemas.microsoft.com/office/drawing/2014/main" xmlns="" val="20002"/>
+                      <a16:colId xmlns="" xmlns:a16="http://schemas.microsoft.com/office/drawing/2014/main" val="20002"/>
                     </a:ext>
                   </a:extLst>
                 </a:gridCol>
                 <a:gridCol w="717523">
                   <a:extLst>
                     <a:ext uri="{9D8B030D-6E8A-4147-A177-3AD203B41FA5}">
-                      <a16:colId xmlns:a16="http://schemas.microsoft.com/office/drawing/2014/main" xmlns="" val="20003"/>
+                      <a16:colId xmlns="" xmlns:a16="http://schemas.microsoft.com/office/drawing/2014/main" val="20003"/>
                     </a:ext>
                   </a:extLst>
                 </a:gridCol>
                 <a:gridCol w="800312">
                   <a:extLst>
                     <a:ext uri="{9D8B030D-6E8A-4147-A177-3AD203B41FA5}">
-                      <a16:colId xmlns:a16="http://schemas.microsoft.com/office/drawing/2014/main" xmlns="" val="20004"/>
+                      <a16:colId xmlns="" xmlns:a16="http://schemas.microsoft.com/office/drawing/2014/main" val="20004"/>
                     </a:ext>
                   </a:extLst>
                 </a:gridCol>
                 <a:gridCol w="682639">
                   <a:extLst>
                     <a:ext uri="{9D8B030D-6E8A-4147-A177-3AD203B41FA5}">
-                      <a16:colId xmlns:a16="http://schemas.microsoft.com/office/drawing/2014/main" xmlns="" val="20005"/>
+                      <a16:colId xmlns="" xmlns:a16="http://schemas.microsoft.com/office/drawing/2014/main" val="20005"/>
                     </a:ext>
                   </a:extLst>
                 </a:gridCol>
                 <a:gridCol w="1002749">
                   <a:extLst>
                     <a:ext uri="{9D8B030D-6E8A-4147-A177-3AD203B41FA5}">
-                      <a16:colId xmlns:a16="http://schemas.microsoft.com/office/drawing/2014/main" xmlns="" val="20006"/>
+                      <a16:colId xmlns="" xmlns:a16="http://schemas.microsoft.com/office/drawing/2014/main" val="20006"/>
                     </a:ext>
                   </a:extLst>
                 </a:gridCol>
                 <a:gridCol w="1020104">
                   <a:extLst>
                     <a:ext uri="{9D8B030D-6E8A-4147-A177-3AD203B41FA5}">
-                      <a16:colId xmlns:a16="http://schemas.microsoft.com/office/drawing/2014/main" xmlns="" val="20007"/>
+                      <a16:colId xmlns="" xmlns:a16="http://schemas.microsoft.com/office/drawing/2014/main" val="20007"/>
                     </a:ext>
                   </a:extLst>
                 </a:gridCol>
                 <a:gridCol w="1020104">
                   <a:extLst>
                     <a:ext uri="{9D8B030D-6E8A-4147-A177-3AD203B41FA5}">
-                      <a16:colId xmlns:a16="http://schemas.microsoft.com/office/drawing/2014/main" xmlns="" val="20008"/>
+                      <a16:colId xmlns="" xmlns:a16="http://schemas.microsoft.com/office/drawing/2014/main" val="20008"/>
                     </a:ext>
                   </a:extLst>
                 </a:gridCol>
@@ -7167,7 +7167,7 @@
                 </a:tc>
                 <a:extLst>
                   <a:ext uri="{0D108BD9-81ED-4DB2-BD59-A6C34878D82A}">
-                    <a16:rowId xmlns:a16="http://schemas.microsoft.com/office/drawing/2014/main" xmlns="" val="10000"/>
+                    <a16:rowId xmlns="" xmlns:a16="http://schemas.microsoft.com/office/drawing/2014/main" val="10000"/>
                   </a:ext>
                 </a:extLst>
               </a:tr>
@@ -7271,7 +7271,7 @@
                 </a:tc>
                 <a:extLst>
                   <a:ext uri="{0D108BD9-81ED-4DB2-BD59-A6C34878D82A}">
-                    <a16:rowId xmlns:a16="http://schemas.microsoft.com/office/drawing/2014/main" xmlns="" val="10001"/>
+                    <a16:rowId xmlns="" xmlns:a16="http://schemas.microsoft.com/office/drawing/2014/main" val="10001"/>
                   </a:ext>
                 </a:extLst>
               </a:tr>
@@ -7471,7 +7471,7 @@
                 </a:tc>
                 <a:extLst>
                   <a:ext uri="{0D108BD9-81ED-4DB2-BD59-A6C34878D82A}">
-                    <a16:rowId xmlns:a16="http://schemas.microsoft.com/office/drawing/2014/main" xmlns="" val="10002"/>
+                    <a16:rowId xmlns="" xmlns:a16="http://schemas.microsoft.com/office/drawing/2014/main" val="10002"/>
                   </a:ext>
                 </a:extLst>
               </a:tr>
@@ -7568,7 +7568,7 @@
                 </a:tc>
                 <a:extLst>
                   <a:ext uri="{0D108BD9-81ED-4DB2-BD59-A6C34878D82A}">
-                    <a16:rowId xmlns:a16="http://schemas.microsoft.com/office/drawing/2014/main" xmlns="" val="10003"/>
+                    <a16:rowId xmlns="" xmlns:a16="http://schemas.microsoft.com/office/drawing/2014/main" val="10003"/>
                   </a:ext>
                 </a:extLst>
               </a:tr>
@@ -7665,7 +7665,7 @@
                 </a:tc>
                 <a:extLst>
                   <a:ext uri="{0D108BD9-81ED-4DB2-BD59-A6C34878D82A}">
-                    <a16:rowId xmlns:a16="http://schemas.microsoft.com/office/drawing/2014/main" xmlns="" val="10004"/>
+                    <a16:rowId xmlns="" xmlns:a16="http://schemas.microsoft.com/office/drawing/2014/main" val="10004"/>
                   </a:ext>
                 </a:extLst>
               </a:tr>
@@ -7762,7 +7762,7 @@
                 </a:tc>
                 <a:extLst>
                   <a:ext uri="{0D108BD9-81ED-4DB2-BD59-A6C34878D82A}">
-                    <a16:rowId xmlns:a16="http://schemas.microsoft.com/office/drawing/2014/main" xmlns="" val="10005"/>
+                    <a16:rowId xmlns="" xmlns:a16="http://schemas.microsoft.com/office/drawing/2014/main" val="10005"/>
                   </a:ext>
                 </a:extLst>
               </a:tr>
@@ -7859,7 +7859,7 @@
                 </a:tc>
                 <a:extLst>
                   <a:ext uri="{0D108BD9-81ED-4DB2-BD59-A6C34878D82A}">
-                    <a16:rowId xmlns:a16="http://schemas.microsoft.com/office/drawing/2014/main" xmlns="" val="10006"/>
+                    <a16:rowId xmlns="" xmlns:a16="http://schemas.microsoft.com/office/drawing/2014/main" val="10006"/>
                   </a:ext>
                 </a:extLst>
               </a:tr>
@@ -7956,7 +7956,7 @@
                 </a:tc>
                 <a:extLst>
                   <a:ext uri="{0D108BD9-81ED-4DB2-BD59-A6C34878D82A}">
-                    <a16:rowId xmlns:a16="http://schemas.microsoft.com/office/drawing/2014/main" xmlns="" val="10007"/>
+                    <a16:rowId xmlns="" xmlns:a16="http://schemas.microsoft.com/office/drawing/2014/main" val="10007"/>
                   </a:ext>
                 </a:extLst>
               </a:tr>
@@ -8874,35 +8874,35 @@
                 <a:gridCol w="1604285">
                   <a:extLst>
                     <a:ext uri="{9D8B030D-6E8A-4147-A177-3AD203B41FA5}">
-                      <a16:colId xmlns:a16="http://schemas.microsoft.com/office/drawing/2014/main" xmlns="" val="20000"/>
+                      <a16:colId xmlns="" xmlns:a16="http://schemas.microsoft.com/office/drawing/2014/main" val="20000"/>
                     </a:ext>
                   </a:extLst>
                 </a:gridCol>
                 <a:gridCol w="961211">
                   <a:extLst>
                     <a:ext uri="{9D8B030D-6E8A-4147-A177-3AD203B41FA5}">
-                      <a16:colId xmlns:a16="http://schemas.microsoft.com/office/drawing/2014/main" xmlns="" val="20001"/>
+                      <a16:colId xmlns="" xmlns:a16="http://schemas.microsoft.com/office/drawing/2014/main" val="20001"/>
                     </a:ext>
                   </a:extLst>
                 </a:gridCol>
                 <a:gridCol w="1753861">
                   <a:extLst>
                     <a:ext uri="{9D8B030D-6E8A-4147-A177-3AD203B41FA5}">
-                      <a16:colId xmlns:a16="http://schemas.microsoft.com/office/drawing/2014/main" xmlns="" val="20002"/>
+                      <a16:colId xmlns="" xmlns:a16="http://schemas.microsoft.com/office/drawing/2014/main" val="20002"/>
                     </a:ext>
                   </a:extLst>
                 </a:gridCol>
                 <a:gridCol w="1694984">
                   <a:extLst>
                     <a:ext uri="{9D8B030D-6E8A-4147-A177-3AD203B41FA5}">
-                      <a16:colId xmlns:a16="http://schemas.microsoft.com/office/drawing/2014/main" xmlns="" val="20003"/>
+                      <a16:colId xmlns="" xmlns:a16="http://schemas.microsoft.com/office/drawing/2014/main" val="20003"/>
                     </a:ext>
                   </a:extLst>
                 </a:gridCol>
                 <a:gridCol w="2022030">
                   <a:extLst>
                     <a:ext uri="{9D8B030D-6E8A-4147-A177-3AD203B41FA5}">
-                      <a16:colId xmlns:a16="http://schemas.microsoft.com/office/drawing/2014/main" xmlns="" val="20004"/>
+                      <a16:colId xmlns="" xmlns:a16="http://schemas.microsoft.com/office/drawing/2014/main" val="20004"/>
                     </a:ext>
                   </a:extLst>
                 </a:gridCol>
@@ -9076,7 +9076,7 @@
                 </a:tc>
                 <a:extLst>
                   <a:ext uri="{0D108BD9-81ED-4DB2-BD59-A6C34878D82A}">
-                    <a16:rowId xmlns:a16="http://schemas.microsoft.com/office/drawing/2014/main" xmlns="" val="10000"/>
+                    <a16:rowId xmlns="" xmlns:a16="http://schemas.microsoft.com/office/drawing/2014/main" val="10000"/>
                   </a:ext>
                 </a:extLst>
               </a:tr>
@@ -9616,7 +9616,7 @@
                 </a:tc>
                 <a:extLst>
                   <a:ext uri="{0D108BD9-81ED-4DB2-BD59-A6C34878D82A}">
-                    <a16:rowId xmlns:a16="http://schemas.microsoft.com/office/drawing/2014/main" xmlns="" val="10001"/>
+                    <a16:rowId xmlns="" xmlns:a16="http://schemas.microsoft.com/office/drawing/2014/main" val="10001"/>
                   </a:ext>
                 </a:extLst>
               </a:tr>
@@ -9708,15 +9708,7 @@
                           <a:latin typeface="Times New Roman" panose="02020603050405020304" pitchFamily="18" charset="0"/>
                           <a:ea typeface="Arial Unicode MS" panose="020B0604020202020204" pitchFamily="34" charset="-128"/>
                         </a:rPr>
-                        <a:t>Yaklaşık </a:t>
-                      </a:r>
-                      <a:r>
-                        <a:rPr lang="tr-TR" sz="1200" u="none" kern="50" dirty="0" smtClean="0">
-                          <a:effectLst/>
-                          <a:latin typeface="Times New Roman" panose="02020603050405020304" pitchFamily="18" charset="0"/>
-                          <a:ea typeface="Arial Unicode MS" panose="020B0604020202020204" pitchFamily="34" charset="-128"/>
-                        </a:rPr>
-                        <a:t>19.000</a:t>
+                        <a:t>Yaklaşık 19.000</a:t>
                       </a:r>
                       <a:r>
                         <a:rPr lang="tr-TR" sz="1200" u="none" kern="50" baseline="0" dirty="0" smtClean="0">
@@ -9905,15 +9897,7 @@
                           <a:latin typeface="Times New Roman" panose="02020603050405020304" pitchFamily="18" charset="0"/>
                           <a:ea typeface="Arial Unicode MS" panose="020B0604020202020204" pitchFamily="34" charset="-128"/>
                         </a:rPr>
-                        <a:t>Yaklaşık </a:t>
-                      </a:r>
-                      <a:r>
-                        <a:rPr lang="tr-TR" sz="1200" u="none" kern="50" dirty="0" smtClean="0">
-                          <a:effectLst/>
-                          <a:latin typeface="Times New Roman" panose="02020603050405020304" pitchFamily="18" charset="0"/>
-                          <a:ea typeface="Arial Unicode MS" panose="020B0604020202020204" pitchFamily="34" charset="-128"/>
-                        </a:rPr>
-                        <a:t>18,570</a:t>
+                        <a:t>Yaklaşık 18,570</a:t>
                       </a:r>
                       <a:r>
                         <a:rPr lang="tr-TR" sz="1200" u="none" kern="50" baseline="0" dirty="0" smtClean="0">
@@ -9929,15 +9913,7 @@
                           <a:latin typeface="Times New Roman" panose="02020603050405020304" pitchFamily="18" charset="0"/>
                           <a:ea typeface="Arial Unicode MS" panose="020B0604020202020204" pitchFamily="34" charset="-128"/>
                         </a:rPr>
-                        <a:t>TL’ye </a:t>
-                      </a:r>
-                      <a:r>
-                        <a:rPr lang="tr-TR" sz="1200" u="none" kern="50" dirty="0" smtClean="0">
-                          <a:effectLst/>
-                          <a:latin typeface="Times New Roman" panose="02020603050405020304" pitchFamily="18" charset="0"/>
-                          <a:ea typeface="Arial Unicode MS" panose="020B0604020202020204" pitchFamily="34" charset="-128"/>
-                        </a:rPr>
-                        <a:t>mal olan ve geri dönüşümü 4,5 ay</a:t>
+                        <a:t>TL’ye mal olan ve geri dönüşümü 4,5 ay</a:t>
                       </a:r>
                       <a:r>
                         <a:rPr lang="tr-TR" sz="1200" u="none" kern="50" baseline="0" dirty="0" smtClean="0">
@@ -9994,7 +9970,7 @@
                 </a:tc>
                 <a:extLst>
                   <a:ext uri="{0D108BD9-81ED-4DB2-BD59-A6C34878D82A}">
-                    <a16:rowId xmlns:a16="http://schemas.microsoft.com/office/drawing/2014/main" xmlns="" val="10002"/>
+                    <a16:rowId xmlns="" xmlns:a16="http://schemas.microsoft.com/office/drawing/2014/main" val="10002"/>
                   </a:ext>
                 </a:extLst>
               </a:tr>
@@ -10133,15 +10109,7 @@
                           <a:latin typeface="Times New Roman" panose="02020603050405020304" pitchFamily="18" charset="0"/>
                           <a:ea typeface="Arial Unicode MS" panose="020B0604020202020204" pitchFamily="34" charset="-128"/>
                         </a:rPr>
-                        <a:t>3,5 </a:t>
-                      </a:r>
-                      <a:r>
-                        <a:rPr lang="tr-TR" sz="1200" kern="50" dirty="0" smtClean="0">
-                          <a:effectLst/>
-                          <a:latin typeface="Times New Roman" panose="02020603050405020304" pitchFamily="18" charset="0"/>
-                          <a:ea typeface="Arial Unicode MS" panose="020B0604020202020204" pitchFamily="34" charset="-128"/>
-                        </a:rPr>
-                        <a:t>ay</a:t>
+                        <a:t>3,5 ay</a:t>
                       </a:r>
                     </a:p>
                     <a:p>
@@ -10258,18 +10226,13 @@
                         </a:rPr>
                         <a:t>Puan:85</a:t>
                       </a:r>
-                      <a:endParaRPr lang="tr-TR" sz="1200" kern="50" dirty="0" smtClean="0">
-                        <a:effectLst/>
-                        <a:latin typeface="Times New Roman" panose="02020603050405020304" pitchFamily="18" charset="0"/>
-                        <a:ea typeface="Arial Unicode MS" panose="020B0604020202020204" pitchFamily="34" charset="-128"/>
-                      </a:endParaRPr>
                     </a:p>
                   </a:txBody>
                   <a:tcPr marL="68580" marR="68580" marT="0" marB="0"/>
                 </a:tc>
                 <a:extLst>
                   <a:ext uri="{0D108BD9-81ED-4DB2-BD59-A6C34878D82A}">
-                    <a16:rowId xmlns:a16="http://schemas.microsoft.com/office/drawing/2014/main" xmlns="" val="10003"/>
+                    <a16:rowId xmlns="" xmlns:a16="http://schemas.microsoft.com/office/drawing/2014/main" val="10003"/>
                   </a:ext>
                 </a:extLst>
               </a:tr>
@@ -10903,11 +10866,6 @@
                         </a:rPr>
                         <a:t>Puan:65</a:t>
                       </a:r>
-                      <a:endParaRPr lang="tr-TR" sz="1200" kern="50" baseline="0" dirty="0" smtClean="0">
-                        <a:effectLst/>
-                        <a:latin typeface="Times New Roman" panose="02020603050405020304" pitchFamily="18" charset="0"/>
-                        <a:ea typeface="Arial Unicode MS" panose="020B0604020202020204" pitchFamily="34" charset="-128"/>
-                      </a:endParaRPr>
                     </a:p>
                     <a:p>
                       <a:pPr marL="0" marR="0" algn="l">
@@ -10956,18 +10914,13 @@
                         </a:rPr>
                         <a:t>80,5</a:t>
                       </a:r>
-                      <a:endParaRPr lang="tr-TR" sz="1200" kern="50" dirty="0" smtClean="0">
-                        <a:effectLst/>
-                        <a:latin typeface="Times New Roman" panose="02020603050405020304" pitchFamily="18" charset="0"/>
-                        <a:ea typeface="Arial Unicode MS" panose="020B0604020202020204" pitchFamily="34" charset="-128"/>
-                      </a:endParaRPr>
                     </a:p>
                   </a:txBody>
                   <a:tcPr marL="68580" marR="68580" marT="0" marB="0"/>
                 </a:tc>
                 <a:extLst>
                   <a:ext uri="{0D108BD9-81ED-4DB2-BD59-A6C34878D82A}">
-                    <a16:rowId xmlns:a16="http://schemas.microsoft.com/office/drawing/2014/main" xmlns="" val="10004"/>
+                    <a16:rowId xmlns="" xmlns:a16="http://schemas.microsoft.com/office/drawing/2014/main" val="10004"/>
                   </a:ext>
                 </a:extLst>
               </a:tr>
@@ -11111,15 +11064,15 @@
         </p:nvSpPr>
         <p:spPr>
           <a:xfrm>
-            <a:off x="1038896" y="1068132"/>
-            <a:ext cx="6096000" cy="4632037"/>
+            <a:off x="1038895" y="1068132"/>
+            <a:ext cx="8176049" cy="2893100"/>
           </a:xfrm>
           <a:prstGeom prst="rect">
             <a:avLst/>
           </a:prstGeom>
         </p:spPr>
         <p:txBody>
-          <a:bodyPr>
+          <a:bodyPr wrap="square">
             <a:spAutoFit/>
           </a:bodyPr>
           <a:lstStyle/>
@@ -11182,7 +11135,63 @@
                 <a:latin typeface="Times New Roman" panose="02020603050405020304" pitchFamily="18" charset="0"/>
                 <a:ea typeface="Arial Unicode MS" panose="020B0604020202020204" pitchFamily="34" charset="-128"/>
               </a:rPr>
-              <a:t> Gelişmiş bilgi sistemleri ürünlerin daha verimli şekilde satılmasını ve depolanması, takibinin kolaylaşması, kullanıcı memnuniyetinin artması gibi temellere dayanarak genel anlamda firmanın kârını ve bilinilirliğini artırmak üzere geliştirilen sistemlerdir. Günümüzde hemen hemen tüm kurumsal firmalar gelişmiş bir bilgi sistemine sahiptir.</a:t>
+              <a:t> </a:t>
+            </a:r>
+            <a:r>
+              <a:rPr lang="tr-TR" kern="50" dirty="0" err="1">
+                <a:latin typeface="Times New Roman" panose="02020603050405020304" pitchFamily="18" charset="0"/>
+                <a:ea typeface="Arial Unicode MS" panose="020B0604020202020204" pitchFamily="34" charset="-128"/>
+              </a:rPr>
+              <a:t>Bloglar</a:t>
+            </a:r>
+            <a:r>
+              <a:rPr lang="tr-TR" kern="50" dirty="0">
+                <a:latin typeface="Times New Roman" panose="02020603050405020304" pitchFamily="18" charset="0"/>
+                <a:ea typeface="Arial Unicode MS" panose="020B0604020202020204" pitchFamily="34" charset="-128"/>
+              </a:rPr>
+              <a:t> birçok konudan bir sürü farklı içerik ve resmi içerisinde barındırabilir. Bu o </a:t>
+            </a:r>
+            <a:r>
+              <a:rPr lang="tr-TR" kern="50" dirty="0" err="1">
+                <a:latin typeface="Times New Roman" panose="02020603050405020304" pitchFamily="18" charset="0"/>
+                <a:ea typeface="Arial Unicode MS" panose="020B0604020202020204" pitchFamily="34" charset="-128"/>
+              </a:rPr>
+              <a:t>blog</a:t>
+            </a:r>
+            <a:r>
+              <a:rPr lang="tr-TR" kern="50" dirty="0">
+                <a:latin typeface="Times New Roman" panose="02020603050405020304" pitchFamily="18" charset="0"/>
+                <a:ea typeface="Arial Unicode MS" panose="020B0604020202020204" pitchFamily="34" charset="-128"/>
+              </a:rPr>
+              <a:t> sahibinin isteğine ve o </a:t>
+            </a:r>
+            <a:r>
+              <a:rPr lang="tr-TR" kern="50" dirty="0" err="1">
+                <a:latin typeface="Times New Roman" panose="02020603050405020304" pitchFamily="18" charset="0"/>
+                <a:ea typeface="Arial Unicode MS" panose="020B0604020202020204" pitchFamily="34" charset="-128"/>
+              </a:rPr>
+              <a:t>blog</a:t>
+            </a:r>
+            <a:r>
+              <a:rPr lang="tr-TR" kern="50" dirty="0">
+                <a:latin typeface="Times New Roman" panose="02020603050405020304" pitchFamily="18" charset="0"/>
+                <a:ea typeface="Arial Unicode MS" panose="020B0604020202020204" pitchFamily="34" charset="-128"/>
+              </a:rPr>
+              <a:t> yapınsın belirlediği standartlara göre değişiklik gösterir. Önemli olan </a:t>
+            </a:r>
+            <a:r>
+              <a:rPr lang="tr-TR" kern="50" dirty="0" err="1">
+                <a:latin typeface="Times New Roman" panose="02020603050405020304" pitchFamily="18" charset="0"/>
+                <a:ea typeface="Arial Unicode MS" panose="020B0604020202020204" pitchFamily="34" charset="-128"/>
+              </a:rPr>
+              <a:t>blog</a:t>
+            </a:r>
+            <a:r>
+              <a:rPr lang="tr-TR" kern="50" dirty="0">
+                <a:latin typeface="Times New Roman" panose="02020603050405020304" pitchFamily="18" charset="0"/>
+                <a:ea typeface="Arial Unicode MS" panose="020B0604020202020204" pitchFamily="34" charset="-128"/>
+              </a:rPr>
+              <a:t> içinde yazılan konuların bir bütünlük ve uyumluluk göstermesidir. Peki, hep aynı konudan mı yazılacak? Hayır !!! Farklı konulardan da yazsanız bu sefer de uyumsuzluğun getirdiği uyumluluğu yakalarsınız. </a:t>
             </a:r>
             <a:endParaRPr lang="en-US" kern="50" dirty="0" smtClean="0">
               <a:effectLst/>
@@ -11196,50 +11205,6 @@
                 <a:spcPts val="600"/>
               </a:spcAft>
             </a:pPr>
-            <a:r>
-              <a:rPr lang="tr-TR" kern="50" dirty="0" smtClean="0">
-                <a:effectLst/>
-                <a:latin typeface="Times New Roman" panose="02020603050405020304" pitchFamily="18" charset="0"/>
-                <a:ea typeface="Arial Unicode MS" panose="020B0604020202020204" pitchFamily="34" charset="-128"/>
-              </a:rPr>
-              <a:t> </a:t>
-            </a:r>
-            <a:endParaRPr lang="en-US" kern="50" dirty="0" smtClean="0">
-              <a:effectLst/>
-              <a:latin typeface="Times New Roman" panose="02020603050405020304" pitchFamily="18" charset="0"/>
-              <a:ea typeface="Arial Unicode MS" panose="020B0604020202020204" pitchFamily="34" charset="-128"/>
-            </a:endParaRPr>
-          </a:p>
-          <a:p>
-            <a:pPr indent="449580" algn="just">
-              <a:spcAft>
-                <a:spcPts val="600"/>
-              </a:spcAft>
-            </a:pPr>
-            <a:r>
-              <a:rPr lang="tr-TR" kern="50" dirty="0" smtClean="0">
-                <a:effectLst/>
-                <a:latin typeface="Times New Roman" panose="02020603050405020304" pitchFamily="18" charset="0"/>
-                <a:ea typeface="Arial Unicode MS" panose="020B0604020202020204" pitchFamily="34" charset="-128"/>
-              </a:rPr>
-              <a:t>Mevcut ürün satış sisteminde bilgilerin güncellenmesi, kullanıcı bilgileri, şubeler arası iletişim kopukluğu, depo bilgisi, istatistiksel veriler, </a:t>
-            </a:r>
-            <a:r>
-              <a:rPr lang="tr-TR" kern="50" dirty="0" err="1" smtClean="0">
-                <a:effectLst/>
-                <a:latin typeface="Times New Roman" panose="02020603050405020304" pitchFamily="18" charset="0"/>
-                <a:ea typeface="Arial Unicode MS" panose="020B0604020202020204" pitchFamily="34" charset="-128"/>
-              </a:rPr>
-              <a:t>feedback</a:t>
-            </a:r>
-            <a:r>
-              <a:rPr lang="tr-TR" kern="50" dirty="0" smtClean="0">
-                <a:effectLst/>
-                <a:latin typeface="Times New Roman" panose="02020603050405020304" pitchFamily="18" charset="0"/>
-                <a:ea typeface="Arial Unicode MS" panose="020B0604020202020204" pitchFamily="34" charset="-128"/>
-              </a:rPr>
-              <a:t> sistemi konularında çok ciddi eksiklikler vardı. Bu sorunlar üretimin yavaşlaması, maliyetin artması ve müşteri kaybı gibi çok ciddi sorunlara yol açıyordu.</a:t>
-            </a:r>
             <a:endParaRPr lang="en-US" kern="50" dirty="0" smtClean="0">
               <a:effectLst/>
               <a:latin typeface="Times New Roman" panose="02020603050405020304" pitchFamily="18" charset="0"/>
@@ -11314,14 +11279,14 @@
         <p:spPr>
           <a:xfrm>
             <a:off x="768439" y="877787"/>
-            <a:ext cx="6096000" cy="5463034"/>
+            <a:ext cx="9542209" cy="4001095"/>
           </a:xfrm>
           <a:prstGeom prst="rect">
             <a:avLst/>
           </a:prstGeom>
         </p:spPr>
         <p:txBody>
-          <a:bodyPr>
+          <a:bodyPr wrap="square">
             <a:spAutoFit/>
           </a:bodyPr>
           <a:lstStyle/>
@@ -11332,59 +11297,818 @@
               </a:spcAft>
             </a:pPr>
             <a:r>
-              <a:rPr lang="tr-TR" kern="50" smtClean="0">
-                <a:effectLst/>
-                <a:latin typeface="Times New Roman" panose="02020603050405020304" pitchFamily="18" charset="0"/>
-                <a:ea typeface="Arial Unicode MS" panose="020B0604020202020204" pitchFamily="34" charset="-128"/>
-              </a:rPr>
-              <a:t>Bu sorunları çözmek için güncel bir sisteme ihtiyaç vardı. </a:t>
-            </a:r>
-            <a:r>
-              <a:rPr lang="tr-TR" kern="50" dirty="0" smtClean="0">
-                <a:effectLst/>
-                <a:latin typeface="Times New Roman" panose="02020603050405020304" pitchFamily="18" charset="0"/>
-                <a:ea typeface="Arial Unicode MS" panose="020B0604020202020204" pitchFamily="34" charset="-128"/>
-              </a:rPr>
-              <a:t>Bahsedilen mevcut sorunları çözmenin </a:t>
-            </a:r>
-            <a:r>
-              <a:rPr lang="tr-TR" kern="50" dirty="0" err="1" smtClean="0">
-                <a:effectLst/>
-                <a:latin typeface="Times New Roman" panose="02020603050405020304" pitchFamily="18" charset="0"/>
-                <a:ea typeface="Arial Unicode MS" panose="020B0604020202020204" pitchFamily="34" charset="-128"/>
-              </a:rPr>
-              <a:t>yanısıra</a:t>
-            </a:r>
-            <a:r>
-              <a:rPr lang="tr-TR" kern="50" dirty="0" smtClean="0">
-                <a:effectLst/>
-                <a:latin typeface="Times New Roman" panose="02020603050405020304" pitchFamily="18" charset="0"/>
-                <a:ea typeface="Arial Unicode MS" panose="020B0604020202020204" pitchFamily="34" charset="-128"/>
-              </a:rPr>
-              <a:t> kolay alışveriş imkânı, stok takibi ve tutulan istatistik ve geri beslemelerle müşteriye alacağı ürün hakkında daha ayrıntılı bilgi vermek de yeni sistemin kapsaması gereken konular içindeydi.</a:t>
-            </a:r>
-            <a:endParaRPr lang="en-US" kern="50" smtClean="0">
-              <a:effectLst/>
-              <a:latin typeface="Times New Roman" panose="02020603050405020304" pitchFamily="18" charset="0"/>
-              <a:ea typeface="Arial Unicode MS" panose="020B0604020202020204" pitchFamily="34" charset="-128"/>
-            </a:endParaRPr>
-          </a:p>
-          <a:p>
-            <a:pPr algn="just">
-              <a:spcAft>
-                <a:spcPts val="600"/>
-              </a:spcAft>
-            </a:pPr>
-            <a:r>
-              <a:rPr lang="tr-TR" kern="50" smtClean="0">
-                <a:effectLst/>
-                <a:latin typeface="Times New Roman" panose="02020603050405020304" pitchFamily="18" charset="0"/>
-                <a:ea typeface="Arial Unicode MS" panose="020B0604020202020204" pitchFamily="34" charset="-128"/>
-              </a:rPr>
-              <a:t> </a:t>
-            </a:r>
-            <a:endParaRPr lang="en-US" kern="50" smtClean="0">
-              <a:effectLst/>
+              <a:rPr lang="en-US" kern="50" dirty="0" err="1">
+                <a:latin typeface="Times New Roman" panose="02020603050405020304" pitchFamily="18" charset="0"/>
+                <a:ea typeface="Arial Unicode MS" panose="020B0604020202020204" pitchFamily="34" charset="-128"/>
+              </a:rPr>
+              <a:t>Kişisel</a:t>
+            </a:r>
+            <a:r>
+              <a:rPr lang="en-US" kern="50" dirty="0">
+                <a:latin typeface="Times New Roman" panose="02020603050405020304" pitchFamily="18" charset="0"/>
+                <a:ea typeface="Arial Unicode MS" panose="020B0604020202020204" pitchFamily="34" charset="-128"/>
+              </a:rPr>
+              <a:t> </a:t>
+            </a:r>
+            <a:r>
+              <a:rPr lang="en-US" kern="50" dirty="0" err="1">
+                <a:latin typeface="Times New Roman" panose="02020603050405020304" pitchFamily="18" charset="0"/>
+                <a:ea typeface="Arial Unicode MS" panose="020B0604020202020204" pitchFamily="34" charset="-128"/>
+              </a:rPr>
+              <a:t>bilgi</a:t>
+            </a:r>
+            <a:r>
+              <a:rPr lang="en-US" kern="50" dirty="0">
+                <a:latin typeface="Times New Roman" panose="02020603050405020304" pitchFamily="18" charset="0"/>
+                <a:ea typeface="Arial Unicode MS" panose="020B0604020202020204" pitchFamily="34" charset="-128"/>
+              </a:rPr>
+              <a:t> </a:t>
+            </a:r>
+            <a:r>
+              <a:rPr lang="en-US" kern="50" dirty="0" err="1">
+                <a:latin typeface="Times New Roman" panose="02020603050405020304" pitchFamily="18" charset="0"/>
+                <a:ea typeface="Arial Unicode MS" panose="020B0604020202020204" pitchFamily="34" charset="-128"/>
+              </a:rPr>
+              <a:t>ve</a:t>
+            </a:r>
+            <a:r>
+              <a:rPr lang="en-US" kern="50" dirty="0">
+                <a:latin typeface="Times New Roman" panose="02020603050405020304" pitchFamily="18" charset="0"/>
+                <a:ea typeface="Arial Unicode MS" panose="020B0604020202020204" pitchFamily="34" charset="-128"/>
+              </a:rPr>
+              <a:t> </a:t>
+            </a:r>
+            <a:r>
+              <a:rPr lang="en-US" kern="50" dirty="0" err="1">
+                <a:latin typeface="Times New Roman" panose="02020603050405020304" pitchFamily="18" charset="0"/>
+                <a:ea typeface="Arial Unicode MS" panose="020B0604020202020204" pitchFamily="34" charset="-128"/>
+              </a:rPr>
+              <a:t>tecrübelerimizi</a:t>
+            </a:r>
+            <a:r>
+              <a:rPr lang="en-US" kern="50" dirty="0">
+                <a:latin typeface="Times New Roman" panose="02020603050405020304" pitchFamily="18" charset="0"/>
+                <a:ea typeface="Arial Unicode MS" panose="020B0604020202020204" pitchFamily="34" charset="-128"/>
+              </a:rPr>
+              <a:t> en </a:t>
+            </a:r>
+            <a:r>
+              <a:rPr lang="en-US" kern="50" dirty="0" err="1">
+                <a:latin typeface="Times New Roman" panose="02020603050405020304" pitchFamily="18" charset="0"/>
+                <a:ea typeface="Arial Unicode MS" panose="020B0604020202020204" pitchFamily="34" charset="-128"/>
+              </a:rPr>
+              <a:t>rahat</a:t>
+            </a:r>
+            <a:r>
+              <a:rPr lang="en-US" kern="50" dirty="0">
+                <a:latin typeface="Times New Roman" panose="02020603050405020304" pitchFamily="18" charset="0"/>
+                <a:ea typeface="Arial Unicode MS" panose="020B0604020202020204" pitchFamily="34" charset="-128"/>
+              </a:rPr>
+              <a:t> </a:t>
+            </a:r>
+            <a:r>
+              <a:rPr lang="en-US" kern="50" dirty="0" err="1">
+                <a:latin typeface="Times New Roman" panose="02020603050405020304" pitchFamily="18" charset="0"/>
+                <a:ea typeface="Arial Unicode MS" panose="020B0604020202020204" pitchFamily="34" charset="-128"/>
+              </a:rPr>
+              <a:t>şekilde</a:t>
+            </a:r>
+            <a:r>
+              <a:rPr lang="en-US" kern="50" dirty="0">
+                <a:latin typeface="Times New Roman" panose="02020603050405020304" pitchFamily="18" charset="0"/>
+                <a:ea typeface="Arial Unicode MS" panose="020B0604020202020204" pitchFamily="34" charset="-128"/>
+              </a:rPr>
+              <a:t> </a:t>
+            </a:r>
+            <a:r>
+              <a:rPr lang="en-US" kern="50" dirty="0" err="1">
+                <a:latin typeface="Times New Roman" panose="02020603050405020304" pitchFamily="18" charset="0"/>
+                <a:ea typeface="Arial Unicode MS" panose="020B0604020202020204" pitchFamily="34" charset="-128"/>
+              </a:rPr>
+              <a:t>ifade</a:t>
+            </a:r>
+            <a:r>
+              <a:rPr lang="en-US" kern="50" dirty="0">
+                <a:latin typeface="Times New Roman" panose="02020603050405020304" pitchFamily="18" charset="0"/>
+                <a:ea typeface="Arial Unicode MS" panose="020B0604020202020204" pitchFamily="34" charset="-128"/>
+              </a:rPr>
+              <a:t> </a:t>
+            </a:r>
+            <a:r>
+              <a:rPr lang="en-US" kern="50" dirty="0" err="1">
+                <a:latin typeface="Times New Roman" panose="02020603050405020304" pitchFamily="18" charset="0"/>
+                <a:ea typeface="Arial Unicode MS" panose="020B0604020202020204" pitchFamily="34" charset="-128"/>
+              </a:rPr>
+              <a:t>edebileceğiniz</a:t>
+            </a:r>
+            <a:r>
+              <a:rPr lang="en-US" kern="50" dirty="0">
+                <a:latin typeface="Times New Roman" panose="02020603050405020304" pitchFamily="18" charset="0"/>
+                <a:ea typeface="Arial Unicode MS" panose="020B0604020202020204" pitchFamily="34" charset="-128"/>
+              </a:rPr>
+              <a:t> </a:t>
+            </a:r>
+            <a:r>
+              <a:rPr lang="en-US" kern="50" dirty="0" err="1">
+                <a:latin typeface="Times New Roman" panose="02020603050405020304" pitchFamily="18" charset="0"/>
+                <a:ea typeface="Arial Unicode MS" panose="020B0604020202020204" pitchFamily="34" charset="-128"/>
+              </a:rPr>
+              <a:t>platformun</a:t>
+            </a:r>
+            <a:r>
+              <a:rPr lang="en-US" kern="50" dirty="0">
+                <a:latin typeface="Times New Roman" panose="02020603050405020304" pitchFamily="18" charset="0"/>
+                <a:ea typeface="Arial Unicode MS" panose="020B0604020202020204" pitchFamily="34" charset="-128"/>
+              </a:rPr>
+              <a:t> </a:t>
+            </a:r>
+            <a:r>
+              <a:rPr lang="en-US" kern="50" dirty="0" err="1">
+                <a:latin typeface="Times New Roman" panose="02020603050405020304" pitchFamily="18" charset="0"/>
+                <a:ea typeface="Arial Unicode MS" panose="020B0604020202020204" pitchFamily="34" charset="-128"/>
+              </a:rPr>
+              <a:t>kişisel</a:t>
+            </a:r>
+            <a:r>
+              <a:rPr lang="en-US" kern="50" dirty="0">
+                <a:latin typeface="Times New Roman" panose="02020603050405020304" pitchFamily="18" charset="0"/>
+                <a:ea typeface="Arial Unicode MS" panose="020B0604020202020204" pitchFamily="34" charset="-128"/>
+              </a:rPr>
+              <a:t> blog </a:t>
+            </a:r>
+            <a:r>
+              <a:rPr lang="en-US" kern="50" dirty="0" err="1">
+                <a:latin typeface="Times New Roman" panose="02020603050405020304" pitchFamily="18" charset="0"/>
+                <a:ea typeface="Arial Unicode MS" panose="020B0604020202020204" pitchFamily="34" charset="-128"/>
+              </a:rPr>
+              <a:t>sayfanızın</a:t>
+            </a:r>
+            <a:r>
+              <a:rPr lang="en-US" kern="50" dirty="0">
+                <a:latin typeface="Times New Roman" panose="02020603050405020304" pitchFamily="18" charset="0"/>
+                <a:ea typeface="Arial Unicode MS" panose="020B0604020202020204" pitchFamily="34" charset="-128"/>
+              </a:rPr>
+              <a:t> </a:t>
+            </a:r>
+            <a:r>
+              <a:rPr lang="en-US" kern="50" dirty="0" err="1">
+                <a:latin typeface="Times New Roman" panose="02020603050405020304" pitchFamily="18" charset="0"/>
+                <a:ea typeface="Arial Unicode MS" panose="020B0604020202020204" pitchFamily="34" charset="-128"/>
+              </a:rPr>
+              <a:t>olabileceğini</a:t>
+            </a:r>
+            <a:r>
+              <a:rPr lang="en-US" kern="50" dirty="0">
+                <a:latin typeface="Times New Roman" panose="02020603050405020304" pitchFamily="18" charset="0"/>
+                <a:ea typeface="Arial Unicode MS" panose="020B0604020202020204" pitchFamily="34" charset="-128"/>
+              </a:rPr>
+              <a:t> </a:t>
+            </a:r>
+            <a:r>
+              <a:rPr lang="en-US" kern="50" dirty="0" err="1">
+                <a:latin typeface="Times New Roman" panose="02020603050405020304" pitchFamily="18" charset="0"/>
+                <a:ea typeface="Arial Unicode MS" panose="020B0604020202020204" pitchFamily="34" charset="-128"/>
+              </a:rPr>
+              <a:t>düşündünüz</a:t>
+            </a:r>
+            <a:r>
+              <a:rPr lang="en-US" kern="50" dirty="0">
+                <a:latin typeface="Times New Roman" panose="02020603050405020304" pitchFamily="18" charset="0"/>
+                <a:ea typeface="Arial Unicode MS" panose="020B0604020202020204" pitchFamily="34" charset="-128"/>
+              </a:rPr>
+              <a:t> </a:t>
+            </a:r>
+            <a:r>
+              <a:rPr lang="en-US" kern="50" dirty="0" err="1">
+                <a:latin typeface="Times New Roman" panose="02020603050405020304" pitchFamily="18" charset="0"/>
+                <a:ea typeface="Arial Unicode MS" panose="020B0604020202020204" pitchFamily="34" charset="-128"/>
+              </a:rPr>
+              <a:t>mü</a:t>
+            </a:r>
+            <a:r>
+              <a:rPr lang="en-US" kern="50" dirty="0">
+                <a:latin typeface="Times New Roman" panose="02020603050405020304" pitchFamily="18" charset="0"/>
+                <a:ea typeface="Arial Unicode MS" panose="020B0604020202020204" pitchFamily="34" charset="-128"/>
+              </a:rPr>
+              <a:t>? </a:t>
+            </a:r>
+            <a:r>
+              <a:rPr lang="en-US" kern="50" dirty="0" err="1">
+                <a:latin typeface="Times New Roman" panose="02020603050405020304" pitchFamily="18" charset="0"/>
+                <a:ea typeface="Arial Unicode MS" panose="020B0604020202020204" pitchFamily="34" charset="-128"/>
+              </a:rPr>
+              <a:t>Bir</a:t>
+            </a:r>
+            <a:r>
+              <a:rPr lang="en-US" kern="50" dirty="0">
+                <a:latin typeface="Times New Roman" panose="02020603050405020304" pitchFamily="18" charset="0"/>
+                <a:ea typeface="Arial Unicode MS" panose="020B0604020202020204" pitchFamily="34" charset="-128"/>
+              </a:rPr>
+              <a:t> </a:t>
+            </a:r>
+            <a:r>
+              <a:rPr lang="en-US" kern="50" dirty="0" err="1">
+                <a:latin typeface="Times New Roman" panose="02020603050405020304" pitchFamily="18" charset="0"/>
+                <a:ea typeface="Arial Unicode MS" panose="020B0604020202020204" pitchFamily="34" charset="-128"/>
+              </a:rPr>
+              <a:t>iş</a:t>
+            </a:r>
+            <a:r>
+              <a:rPr lang="en-US" kern="50" dirty="0">
+                <a:latin typeface="Times New Roman" panose="02020603050405020304" pitchFamily="18" charset="0"/>
+                <a:ea typeface="Arial Unicode MS" panose="020B0604020202020204" pitchFamily="34" charset="-128"/>
+              </a:rPr>
+              <a:t> </a:t>
+            </a:r>
+            <a:r>
+              <a:rPr lang="en-US" kern="50" dirty="0" err="1">
+                <a:latin typeface="Times New Roman" panose="02020603050405020304" pitchFamily="18" charset="0"/>
+                <a:ea typeface="Arial Unicode MS" panose="020B0604020202020204" pitchFamily="34" charset="-128"/>
+              </a:rPr>
+              <a:t>arayışı</a:t>
+            </a:r>
+            <a:r>
+              <a:rPr lang="en-US" kern="50" dirty="0">
+                <a:latin typeface="Times New Roman" panose="02020603050405020304" pitchFamily="18" charset="0"/>
+                <a:ea typeface="Arial Unicode MS" panose="020B0604020202020204" pitchFamily="34" charset="-128"/>
+              </a:rPr>
+              <a:t> </a:t>
+            </a:r>
+            <a:r>
+              <a:rPr lang="en-US" kern="50" dirty="0" err="1">
+                <a:latin typeface="Times New Roman" panose="02020603050405020304" pitchFamily="18" charset="0"/>
+                <a:ea typeface="Arial Unicode MS" panose="020B0604020202020204" pitchFamily="34" charset="-128"/>
+              </a:rPr>
+              <a:t>içerisinde</a:t>
+            </a:r>
+            <a:r>
+              <a:rPr lang="en-US" kern="50" dirty="0">
+                <a:latin typeface="Times New Roman" panose="02020603050405020304" pitchFamily="18" charset="0"/>
+                <a:ea typeface="Arial Unicode MS" panose="020B0604020202020204" pitchFamily="34" charset="-128"/>
+              </a:rPr>
+              <a:t> </a:t>
+            </a:r>
+            <a:r>
+              <a:rPr lang="en-US" kern="50" dirty="0" err="1">
+                <a:latin typeface="Times New Roman" panose="02020603050405020304" pitchFamily="18" charset="0"/>
+                <a:ea typeface="Arial Unicode MS" panose="020B0604020202020204" pitchFamily="34" charset="-128"/>
+              </a:rPr>
+              <a:t>olduğunuzu</a:t>
+            </a:r>
+            <a:r>
+              <a:rPr lang="en-US" kern="50" dirty="0">
+                <a:latin typeface="Times New Roman" panose="02020603050405020304" pitchFamily="18" charset="0"/>
+                <a:ea typeface="Arial Unicode MS" panose="020B0604020202020204" pitchFamily="34" charset="-128"/>
+              </a:rPr>
+              <a:t> </a:t>
+            </a:r>
+            <a:r>
+              <a:rPr lang="en-US" kern="50" dirty="0" err="1">
+                <a:latin typeface="Times New Roman" panose="02020603050405020304" pitchFamily="18" charset="0"/>
+                <a:ea typeface="Arial Unicode MS" panose="020B0604020202020204" pitchFamily="34" charset="-128"/>
+              </a:rPr>
+              <a:t>hayal</a:t>
+            </a:r>
+            <a:r>
+              <a:rPr lang="en-US" kern="50" dirty="0">
+                <a:latin typeface="Times New Roman" panose="02020603050405020304" pitchFamily="18" charset="0"/>
+                <a:ea typeface="Arial Unicode MS" panose="020B0604020202020204" pitchFamily="34" charset="-128"/>
+              </a:rPr>
+              <a:t> </a:t>
+            </a:r>
+            <a:r>
+              <a:rPr lang="en-US" kern="50" dirty="0" err="1">
+                <a:latin typeface="Times New Roman" panose="02020603050405020304" pitchFamily="18" charset="0"/>
+                <a:ea typeface="Arial Unicode MS" panose="020B0604020202020204" pitchFamily="34" charset="-128"/>
+              </a:rPr>
+              <a:t>edin</a:t>
+            </a:r>
+            <a:r>
+              <a:rPr lang="en-US" kern="50" dirty="0">
+                <a:latin typeface="Times New Roman" panose="02020603050405020304" pitchFamily="18" charset="0"/>
+                <a:ea typeface="Arial Unicode MS" panose="020B0604020202020204" pitchFamily="34" charset="-128"/>
+              </a:rPr>
+              <a:t> </a:t>
+            </a:r>
+            <a:r>
+              <a:rPr lang="en-US" kern="50" dirty="0" err="1">
+                <a:latin typeface="Times New Roman" panose="02020603050405020304" pitchFamily="18" charset="0"/>
+                <a:ea typeface="Arial Unicode MS" panose="020B0604020202020204" pitchFamily="34" charset="-128"/>
+              </a:rPr>
+              <a:t>CV’nize</a:t>
+            </a:r>
+            <a:r>
+              <a:rPr lang="en-US" kern="50" dirty="0">
+                <a:latin typeface="Times New Roman" panose="02020603050405020304" pitchFamily="18" charset="0"/>
+                <a:ea typeface="Arial Unicode MS" panose="020B0604020202020204" pitchFamily="34" charset="-128"/>
+              </a:rPr>
+              <a:t> blog </a:t>
+            </a:r>
+            <a:r>
+              <a:rPr lang="en-US" kern="50" dirty="0" err="1">
+                <a:latin typeface="Times New Roman" panose="02020603050405020304" pitchFamily="18" charset="0"/>
+                <a:ea typeface="Arial Unicode MS" panose="020B0604020202020204" pitchFamily="34" charset="-128"/>
+              </a:rPr>
+              <a:t>sayfanızın</a:t>
+            </a:r>
+            <a:r>
+              <a:rPr lang="en-US" kern="50" dirty="0">
+                <a:latin typeface="Times New Roman" panose="02020603050405020304" pitchFamily="18" charset="0"/>
+                <a:ea typeface="Arial Unicode MS" panose="020B0604020202020204" pitchFamily="34" charset="-128"/>
+              </a:rPr>
+              <a:t> </a:t>
+            </a:r>
+            <a:r>
+              <a:rPr lang="en-US" kern="50" dirty="0" err="1">
+                <a:latin typeface="Times New Roman" panose="02020603050405020304" pitchFamily="18" charset="0"/>
+                <a:ea typeface="Arial Unicode MS" panose="020B0604020202020204" pitchFamily="34" charset="-128"/>
+              </a:rPr>
+              <a:t>linkini</a:t>
+            </a:r>
+            <a:r>
+              <a:rPr lang="en-US" kern="50" dirty="0">
+                <a:latin typeface="Times New Roman" panose="02020603050405020304" pitchFamily="18" charset="0"/>
+                <a:ea typeface="Arial Unicode MS" panose="020B0604020202020204" pitchFamily="34" charset="-128"/>
+              </a:rPr>
+              <a:t> </a:t>
+            </a:r>
+            <a:r>
+              <a:rPr lang="en-US" kern="50" dirty="0" err="1">
+                <a:latin typeface="Times New Roman" panose="02020603050405020304" pitchFamily="18" charset="0"/>
+                <a:ea typeface="Arial Unicode MS" panose="020B0604020202020204" pitchFamily="34" charset="-128"/>
+              </a:rPr>
+              <a:t>eklediğinizi</a:t>
+            </a:r>
+            <a:r>
+              <a:rPr lang="en-US" kern="50" dirty="0">
+                <a:latin typeface="Times New Roman" panose="02020603050405020304" pitchFamily="18" charset="0"/>
+                <a:ea typeface="Arial Unicode MS" panose="020B0604020202020204" pitchFamily="34" charset="-128"/>
+              </a:rPr>
+              <a:t> </a:t>
+            </a:r>
+            <a:r>
+              <a:rPr lang="en-US" kern="50" dirty="0" err="1">
+                <a:latin typeface="Times New Roman" panose="02020603050405020304" pitchFamily="18" charset="0"/>
+                <a:ea typeface="Arial Unicode MS" panose="020B0604020202020204" pitchFamily="34" charset="-128"/>
+              </a:rPr>
+              <a:t>düşünelim</a:t>
+            </a:r>
+            <a:r>
+              <a:rPr lang="en-US" kern="50" dirty="0">
+                <a:latin typeface="Times New Roman" panose="02020603050405020304" pitchFamily="18" charset="0"/>
+                <a:ea typeface="Arial Unicode MS" panose="020B0604020202020204" pitchFamily="34" charset="-128"/>
+              </a:rPr>
+              <a:t>.. Bu </a:t>
+            </a:r>
+            <a:r>
+              <a:rPr lang="en-US" kern="50" dirty="0" err="1">
+                <a:latin typeface="Times New Roman" panose="02020603050405020304" pitchFamily="18" charset="0"/>
+                <a:ea typeface="Arial Unicode MS" panose="020B0604020202020204" pitchFamily="34" charset="-128"/>
+              </a:rPr>
+              <a:t>küçük</a:t>
+            </a:r>
+            <a:r>
+              <a:rPr lang="en-US" kern="50" dirty="0">
+                <a:latin typeface="Times New Roman" panose="02020603050405020304" pitchFamily="18" charset="0"/>
+                <a:ea typeface="Arial Unicode MS" panose="020B0604020202020204" pitchFamily="34" charset="-128"/>
+              </a:rPr>
+              <a:t> </a:t>
+            </a:r>
+            <a:r>
+              <a:rPr lang="en-US" kern="50" dirty="0" err="1">
+                <a:latin typeface="Times New Roman" panose="02020603050405020304" pitchFamily="18" charset="0"/>
+                <a:ea typeface="Arial Unicode MS" panose="020B0604020202020204" pitchFamily="34" charset="-128"/>
+              </a:rPr>
+              <a:t>anektod</a:t>
+            </a:r>
+            <a:r>
+              <a:rPr lang="en-US" kern="50" dirty="0">
+                <a:latin typeface="Times New Roman" panose="02020603050405020304" pitchFamily="18" charset="0"/>
+                <a:ea typeface="Arial Unicode MS" panose="020B0604020202020204" pitchFamily="34" charset="-128"/>
+              </a:rPr>
+              <a:t> </a:t>
+            </a:r>
+            <a:r>
+              <a:rPr lang="en-US" kern="50" dirty="0" err="1">
+                <a:latin typeface="Times New Roman" panose="02020603050405020304" pitchFamily="18" charset="0"/>
+                <a:ea typeface="Arial Unicode MS" panose="020B0604020202020204" pitchFamily="34" charset="-128"/>
+              </a:rPr>
+              <a:t>muhakkak</a:t>
+            </a:r>
+            <a:r>
+              <a:rPr lang="en-US" kern="50" dirty="0">
+                <a:latin typeface="Times New Roman" panose="02020603050405020304" pitchFamily="18" charset="0"/>
+                <a:ea typeface="Arial Unicode MS" panose="020B0604020202020204" pitchFamily="34" charset="-128"/>
+              </a:rPr>
+              <a:t> </a:t>
+            </a:r>
+            <a:r>
+              <a:rPr lang="en-US" kern="50" dirty="0" err="1">
+                <a:latin typeface="Times New Roman" panose="02020603050405020304" pitchFamily="18" charset="0"/>
+                <a:ea typeface="Arial Unicode MS" panose="020B0604020202020204" pitchFamily="34" charset="-128"/>
+              </a:rPr>
+              <a:t>ki</a:t>
+            </a:r>
+            <a:r>
+              <a:rPr lang="en-US" kern="50" dirty="0">
+                <a:latin typeface="Times New Roman" panose="02020603050405020304" pitchFamily="18" charset="0"/>
+                <a:ea typeface="Arial Unicode MS" panose="020B0604020202020204" pitchFamily="34" charset="-128"/>
+              </a:rPr>
+              <a:t> </a:t>
+            </a:r>
+            <a:r>
+              <a:rPr lang="en-US" kern="50" dirty="0" err="1">
+                <a:latin typeface="Times New Roman" panose="02020603050405020304" pitchFamily="18" charset="0"/>
+                <a:ea typeface="Arial Unicode MS" panose="020B0604020202020204" pitchFamily="34" charset="-128"/>
+              </a:rPr>
+              <a:t>cv’nizi</a:t>
+            </a:r>
+            <a:r>
+              <a:rPr lang="en-US" kern="50" dirty="0">
+                <a:latin typeface="Times New Roman" panose="02020603050405020304" pitchFamily="18" charset="0"/>
+                <a:ea typeface="Arial Unicode MS" panose="020B0604020202020204" pitchFamily="34" charset="-128"/>
+              </a:rPr>
+              <a:t> </a:t>
+            </a:r>
+            <a:r>
+              <a:rPr lang="en-US" kern="50" dirty="0" err="1">
+                <a:latin typeface="Times New Roman" panose="02020603050405020304" pitchFamily="18" charset="0"/>
+                <a:ea typeface="Arial Unicode MS" panose="020B0604020202020204" pitchFamily="34" charset="-128"/>
+              </a:rPr>
+              <a:t>inceleyen</a:t>
+            </a:r>
+            <a:r>
+              <a:rPr lang="en-US" kern="50" dirty="0">
+                <a:latin typeface="Times New Roman" panose="02020603050405020304" pitchFamily="18" charset="0"/>
+                <a:ea typeface="Arial Unicode MS" panose="020B0604020202020204" pitchFamily="34" charset="-128"/>
+              </a:rPr>
+              <a:t> </a:t>
+            </a:r>
+            <a:r>
+              <a:rPr lang="en-US" kern="50" dirty="0" err="1">
+                <a:latin typeface="Times New Roman" panose="02020603050405020304" pitchFamily="18" charset="0"/>
+                <a:ea typeface="Arial Unicode MS" panose="020B0604020202020204" pitchFamily="34" charset="-128"/>
+              </a:rPr>
+              <a:t>insan</a:t>
+            </a:r>
+            <a:r>
+              <a:rPr lang="en-US" kern="50" dirty="0">
+                <a:latin typeface="Times New Roman" panose="02020603050405020304" pitchFamily="18" charset="0"/>
+                <a:ea typeface="Arial Unicode MS" panose="020B0604020202020204" pitchFamily="34" charset="-128"/>
+              </a:rPr>
+              <a:t> </a:t>
+            </a:r>
+            <a:r>
+              <a:rPr lang="en-US" kern="50" dirty="0" err="1">
+                <a:latin typeface="Times New Roman" panose="02020603050405020304" pitchFamily="18" charset="0"/>
+                <a:ea typeface="Arial Unicode MS" panose="020B0604020202020204" pitchFamily="34" charset="-128"/>
+              </a:rPr>
+              <a:t>kaynakları</a:t>
+            </a:r>
+            <a:r>
+              <a:rPr lang="en-US" kern="50" dirty="0">
+                <a:latin typeface="Times New Roman" panose="02020603050405020304" pitchFamily="18" charset="0"/>
+                <a:ea typeface="Arial Unicode MS" panose="020B0604020202020204" pitchFamily="34" charset="-128"/>
+              </a:rPr>
+              <a:t> </a:t>
+            </a:r>
+            <a:r>
+              <a:rPr lang="en-US" kern="50" dirty="0" err="1">
+                <a:latin typeface="Times New Roman" panose="02020603050405020304" pitchFamily="18" charset="0"/>
+                <a:ea typeface="Arial Unicode MS" panose="020B0604020202020204" pitchFamily="34" charset="-128"/>
+              </a:rPr>
+              <a:t>çalışanının</a:t>
+            </a:r>
+            <a:r>
+              <a:rPr lang="en-US" kern="50" dirty="0">
+                <a:latin typeface="Times New Roman" panose="02020603050405020304" pitchFamily="18" charset="0"/>
+                <a:ea typeface="Arial Unicode MS" panose="020B0604020202020204" pitchFamily="34" charset="-128"/>
+              </a:rPr>
+              <a:t> </a:t>
+            </a:r>
+            <a:r>
+              <a:rPr lang="en-US" kern="50" dirty="0" err="1">
+                <a:latin typeface="Times New Roman" panose="02020603050405020304" pitchFamily="18" charset="0"/>
+                <a:ea typeface="Arial Unicode MS" panose="020B0604020202020204" pitchFamily="34" charset="-128"/>
+              </a:rPr>
+              <a:t>dikkatini</a:t>
+            </a:r>
+            <a:r>
+              <a:rPr lang="en-US" kern="50" dirty="0">
+                <a:latin typeface="Times New Roman" panose="02020603050405020304" pitchFamily="18" charset="0"/>
+                <a:ea typeface="Arial Unicode MS" panose="020B0604020202020204" pitchFamily="34" charset="-128"/>
+              </a:rPr>
+              <a:t> </a:t>
+            </a:r>
+            <a:r>
+              <a:rPr lang="en-US" kern="50" dirty="0" err="1">
+                <a:latin typeface="Times New Roman" panose="02020603050405020304" pitchFamily="18" charset="0"/>
+                <a:ea typeface="Arial Unicode MS" panose="020B0604020202020204" pitchFamily="34" charset="-128"/>
+              </a:rPr>
+              <a:t>çekecek</a:t>
+            </a:r>
+            <a:r>
+              <a:rPr lang="en-US" kern="50" dirty="0">
+                <a:latin typeface="Times New Roman" panose="02020603050405020304" pitchFamily="18" charset="0"/>
+                <a:ea typeface="Arial Unicode MS" panose="020B0604020202020204" pitchFamily="34" charset="-128"/>
+              </a:rPr>
+              <a:t> </a:t>
+            </a:r>
+            <a:r>
+              <a:rPr lang="en-US" kern="50" dirty="0" err="1">
+                <a:latin typeface="Times New Roman" panose="02020603050405020304" pitchFamily="18" charset="0"/>
+                <a:ea typeface="Arial Unicode MS" panose="020B0604020202020204" pitchFamily="34" charset="-128"/>
+              </a:rPr>
+              <a:t>ve</a:t>
+            </a:r>
+            <a:r>
+              <a:rPr lang="en-US" kern="50" dirty="0">
+                <a:latin typeface="Times New Roman" panose="02020603050405020304" pitchFamily="18" charset="0"/>
+                <a:ea typeface="Arial Unicode MS" panose="020B0604020202020204" pitchFamily="34" charset="-128"/>
+              </a:rPr>
+              <a:t> </a:t>
+            </a:r>
+            <a:r>
+              <a:rPr lang="en-US" kern="50" dirty="0" err="1">
+                <a:latin typeface="Times New Roman" panose="02020603050405020304" pitchFamily="18" charset="0"/>
+                <a:ea typeface="Arial Unicode MS" panose="020B0604020202020204" pitchFamily="34" charset="-128"/>
+              </a:rPr>
+              <a:t>sayfanıza</a:t>
+            </a:r>
+            <a:r>
+              <a:rPr lang="en-US" kern="50" dirty="0">
+                <a:latin typeface="Times New Roman" panose="02020603050405020304" pitchFamily="18" charset="0"/>
+                <a:ea typeface="Arial Unicode MS" panose="020B0604020202020204" pitchFamily="34" charset="-128"/>
+              </a:rPr>
+              <a:t> </a:t>
+            </a:r>
+            <a:r>
+              <a:rPr lang="en-US" kern="50" dirty="0" err="1">
+                <a:latin typeface="Times New Roman" panose="02020603050405020304" pitchFamily="18" charset="0"/>
+                <a:ea typeface="Arial Unicode MS" panose="020B0604020202020204" pitchFamily="34" charset="-128"/>
+              </a:rPr>
+              <a:t>bir</a:t>
+            </a:r>
+            <a:r>
+              <a:rPr lang="en-US" kern="50" dirty="0">
+                <a:latin typeface="Times New Roman" panose="02020603050405020304" pitchFamily="18" charset="0"/>
+                <a:ea typeface="Arial Unicode MS" panose="020B0604020202020204" pitchFamily="34" charset="-128"/>
+              </a:rPr>
+              <a:t> </a:t>
+            </a:r>
+            <a:r>
+              <a:rPr lang="en-US" kern="50" dirty="0" err="1">
+                <a:latin typeface="Times New Roman" panose="02020603050405020304" pitchFamily="18" charset="0"/>
+                <a:ea typeface="Arial Unicode MS" panose="020B0604020202020204" pitchFamily="34" charset="-128"/>
+              </a:rPr>
+              <a:t>göz</a:t>
+            </a:r>
+            <a:r>
+              <a:rPr lang="en-US" kern="50" dirty="0">
+                <a:latin typeface="Times New Roman" panose="02020603050405020304" pitchFamily="18" charset="0"/>
+                <a:ea typeface="Arial Unicode MS" panose="020B0604020202020204" pitchFamily="34" charset="-128"/>
+              </a:rPr>
+              <a:t> </a:t>
+            </a:r>
+            <a:r>
+              <a:rPr lang="en-US" kern="50" dirty="0" err="1">
+                <a:latin typeface="Times New Roman" panose="02020603050405020304" pitchFamily="18" charset="0"/>
+                <a:ea typeface="Arial Unicode MS" panose="020B0604020202020204" pitchFamily="34" charset="-128"/>
+              </a:rPr>
+              <a:t>atacaktır</a:t>
+            </a:r>
+            <a:r>
+              <a:rPr lang="en-US" kern="50" dirty="0">
+                <a:latin typeface="Times New Roman" panose="02020603050405020304" pitchFamily="18" charset="0"/>
+                <a:ea typeface="Arial Unicode MS" panose="020B0604020202020204" pitchFamily="34" charset="-128"/>
+              </a:rPr>
+              <a:t>. </a:t>
+            </a:r>
+            <a:r>
+              <a:rPr lang="en-US" kern="50" dirty="0" err="1">
+                <a:latin typeface="Times New Roman" panose="02020603050405020304" pitchFamily="18" charset="0"/>
+                <a:ea typeface="Arial Unicode MS" panose="020B0604020202020204" pitchFamily="34" charset="-128"/>
+              </a:rPr>
+              <a:t>Böylelikle</a:t>
+            </a:r>
+            <a:r>
+              <a:rPr lang="en-US" kern="50" dirty="0">
+                <a:latin typeface="Times New Roman" panose="02020603050405020304" pitchFamily="18" charset="0"/>
+                <a:ea typeface="Arial Unicode MS" panose="020B0604020202020204" pitchFamily="34" charset="-128"/>
+              </a:rPr>
+              <a:t> </a:t>
+            </a:r>
+            <a:r>
+              <a:rPr lang="en-US" kern="50" dirty="0" err="1">
+                <a:latin typeface="Times New Roman" panose="02020603050405020304" pitchFamily="18" charset="0"/>
+                <a:ea typeface="Arial Unicode MS" panose="020B0604020202020204" pitchFamily="34" charset="-128"/>
+              </a:rPr>
+              <a:t>cv’nizde</a:t>
+            </a:r>
+            <a:r>
+              <a:rPr lang="en-US" kern="50" dirty="0">
+                <a:latin typeface="Times New Roman" panose="02020603050405020304" pitchFamily="18" charset="0"/>
+                <a:ea typeface="Arial Unicode MS" panose="020B0604020202020204" pitchFamily="34" charset="-128"/>
+              </a:rPr>
+              <a:t> </a:t>
+            </a:r>
+            <a:r>
+              <a:rPr lang="en-US" kern="50" dirty="0" err="1">
+                <a:latin typeface="Times New Roman" panose="02020603050405020304" pitchFamily="18" charset="0"/>
+                <a:ea typeface="Arial Unicode MS" panose="020B0604020202020204" pitchFamily="34" charset="-128"/>
+              </a:rPr>
+              <a:t>belirttiğiniz</a:t>
+            </a:r>
+            <a:r>
+              <a:rPr lang="en-US" kern="50" dirty="0">
+                <a:latin typeface="Times New Roman" panose="02020603050405020304" pitchFamily="18" charset="0"/>
+                <a:ea typeface="Arial Unicode MS" panose="020B0604020202020204" pitchFamily="34" charset="-128"/>
+              </a:rPr>
+              <a:t> </a:t>
+            </a:r>
+            <a:r>
+              <a:rPr lang="en-US" kern="50" dirty="0" err="1">
+                <a:latin typeface="Times New Roman" panose="02020603050405020304" pitchFamily="18" charset="0"/>
+                <a:ea typeface="Arial Unicode MS" panose="020B0604020202020204" pitchFamily="34" charset="-128"/>
+              </a:rPr>
+              <a:t>birçok</a:t>
+            </a:r>
+            <a:r>
+              <a:rPr lang="en-US" kern="50" dirty="0">
+                <a:latin typeface="Times New Roman" panose="02020603050405020304" pitchFamily="18" charset="0"/>
+                <a:ea typeface="Arial Unicode MS" panose="020B0604020202020204" pitchFamily="34" charset="-128"/>
+              </a:rPr>
+              <a:t> </a:t>
+            </a:r>
+            <a:r>
+              <a:rPr lang="en-US" kern="50" dirty="0" err="1">
+                <a:latin typeface="Times New Roman" panose="02020603050405020304" pitchFamily="18" charset="0"/>
+                <a:ea typeface="Arial Unicode MS" panose="020B0604020202020204" pitchFamily="34" charset="-128"/>
+              </a:rPr>
+              <a:t>tecrübenizin</a:t>
+            </a:r>
+            <a:r>
+              <a:rPr lang="en-US" kern="50" dirty="0">
+                <a:latin typeface="Times New Roman" panose="02020603050405020304" pitchFamily="18" charset="0"/>
+                <a:ea typeface="Arial Unicode MS" panose="020B0604020202020204" pitchFamily="34" charset="-128"/>
+              </a:rPr>
+              <a:t> </a:t>
+            </a:r>
+            <a:r>
+              <a:rPr lang="en-US" kern="50" dirty="0" err="1">
+                <a:latin typeface="Times New Roman" panose="02020603050405020304" pitchFamily="18" charset="0"/>
+                <a:ea typeface="Arial Unicode MS" panose="020B0604020202020204" pitchFamily="34" charset="-128"/>
+              </a:rPr>
+              <a:t>detaylarına</a:t>
+            </a:r>
+            <a:r>
+              <a:rPr lang="en-US" kern="50" dirty="0">
+                <a:latin typeface="Times New Roman" panose="02020603050405020304" pitchFamily="18" charset="0"/>
+                <a:ea typeface="Arial Unicode MS" panose="020B0604020202020204" pitchFamily="34" charset="-128"/>
+              </a:rPr>
+              <a:t> </a:t>
+            </a:r>
+            <a:r>
+              <a:rPr lang="en-US" kern="50" dirty="0" err="1">
+                <a:latin typeface="Times New Roman" panose="02020603050405020304" pitchFamily="18" charset="0"/>
+                <a:ea typeface="Arial Unicode MS" panose="020B0604020202020204" pitchFamily="34" charset="-128"/>
+              </a:rPr>
+              <a:t>sayfanızda</a:t>
+            </a:r>
+            <a:r>
+              <a:rPr lang="en-US" kern="50" dirty="0">
+                <a:latin typeface="Times New Roman" panose="02020603050405020304" pitchFamily="18" charset="0"/>
+                <a:ea typeface="Arial Unicode MS" panose="020B0604020202020204" pitchFamily="34" charset="-128"/>
+              </a:rPr>
+              <a:t> </a:t>
+            </a:r>
+            <a:r>
+              <a:rPr lang="en-US" kern="50" dirty="0" err="1">
+                <a:latin typeface="Times New Roman" panose="02020603050405020304" pitchFamily="18" charset="0"/>
+                <a:ea typeface="Arial Unicode MS" panose="020B0604020202020204" pitchFamily="34" charset="-128"/>
+              </a:rPr>
+              <a:t>ulaşacak</a:t>
+            </a:r>
+            <a:r>
+              <a:rPr lang="en-US" kern="50" dirty="0">
+                <a:latin typeface="Times New Roman" panose="02020603050405020304" pitchFamily="18" charset="0"/>
+                <a:ea typeface="Arial Unicode MS" panose="020B0604020202020204" pitchFamily="34" charset="-128"/>
+              </a:rPr>
+              <a:t> </a:t>
+            </a:r>
+            <a:r>
+              <a:rPr lang="en-US" kern="50" dirty="0" err="1">
+                <a:latin typeface="Times New Roman" panose="02020603050405020304" pitchFamily="18" charset="0"/>
+                <a:ea typeface="Arial Unicode MS" panose="020B0604020202020204" pitchFamily="34" charset="-128"/>
+              </a:rPr>
+              <a:t>insan</a:t>
+            </a:r>
+            <a:r>
+              <a:rPr lang="en-US" kern="50" dirty="0">
+                <a:latin typeface="Times New Roman" panose="02020603050405020304" pitchFamily="18" charset="0"/>
+                <a:ea typeface="Arial Unicode MS" panose="020B0604020202020204" pitchFamily="34" charset="-128"/>
+              </a:rPr>
+              <a:t> </a:t>
+            </a:r>
+            <a:r>
+              <a:rPr lang="en-US" kern="50" dirty="0" err="1">
+                <a:latin typeface="Times New Roman" panose="02020603050405020304" pitchFamily="18" charset="0"/>
+                <a:ea typeface="Arial Unicode MS" panose="020B0604020202020204" pitchFamily="34" charset="-128"/>
+              </a:rPr>
+              <a:t>kaynakları</a:t>
+            </a:r>
+            <a:r>
+              <a:rPr lang="en-US" kern="50" dirty="0">
+                <a:latin typeface="Times New Roman" panose="02020603050405020304" pitchFamily="18" charset="0"/>
+                <a:ea typeface="Arial Unicode MS" panose="020B0604020202020204" pitchFamily="34" charset="-128"/>
+              </a:rPr>
+              <a:t> </a:t>
+            </a:r>
+            <a:r>
+              <a:rPr lang="en-US" kern="50" dirty="0" err="1">
+                <a:latin typeface="Times New Roman" panose="02020603050405020304" pitchFamily="18" charset="0"/>
+                <a:ea typeface="Arial Unicode MS" panose="020B0604020202020204" pitchFamily="34" charset="-128"/>
+              </a:rPr>
+              <a:t>uzmanı</a:t>
+            </a:r>
+            <a:r>
+              <a:rPr lang="en-US" kern="50" dirty="0">
+                <a:latin typeface="Times New Roman" panose="02020603050405020304" pitchFamily="18" charset="0"/>
+                <a:ea typeface="Arial Unicode MS" panose="020B0604020202020204" pitchFamily="34" charset="-128"/>
+              </a:rPr>
+              <a:t> </a:t>
+            </a:r>
+            <a:r>
+              <a:rPr lang="en-US" kern="50" dirty="0" err="1">
+                <a:latin typeface="Times New Roman" panose="02020603050405020304" pitchFamily="18" charset="0"/>
+                <a:ea typeface="Arial Unicode MS" panose="020B0604020202020204" pitchFamily="34" charset="-128"/>
+              </a:rPr>
+              <a:t>inanın</a:t>
+            </a:r>
+            <a:r>
+              <a:rPr lang="en-US" kern="50" dirty="0">
+                <a:latin typeface="Times New Roman" panose="02020603050405020304" pitchFamily="18" charset="0"/>
+                <a:ea typeface="Arial Unicode MS" panose="020B0604020202020204" pitchFamily="34" charset="-128"/>
+              </a:rPr>
+              <a:t> </a:t>
+            </a:r>
+            <a:r>
+              <a:rPr lang="en-US" kern="50" dirty="0" err="1">
+                <a:latin typeface="Times New Roman" panose="02020603050405020304" pitchFamily="18" charset="0"/>
+                <a:ea typeface="Arial Unicode MS" panose="020B0604020202020204" pitchFamily="34" charset="-128"/>
+              </a:rPr>
+              <a:t>sizi</a:t>
+            </a:r>
+            <a:r>
+              <a:rPr lang="en-US" kern="50" dirty="0">
+                <a:latin typeface="Times New Roman" panose="02020603050405020304" pitchFamily="18" charset="0"/>
+                <a:ea typeface="Arial Unicode MS" panose="020B0604020202020204" pitchFamily="34" charset="-128"/>
+              </a:rPr>
+              <a:t> </a:t>
+            </a:r>
+            <a:r>
+              <a:rPr lang="en-US" kern="50" dirty="0" err="1">
+                <a:latin typeface="Times New Roman" panose="02020603050405020304" pitchFamily="18" charset="0"/>
+                <a:ea typeface="Arial Unicode MS" panose="020B0604020202020204" pitchFamily="34" charset="-128"/>
+              </a:rPr>
+              <a:t>görüşülecekler</a:t>
+            </a:r>
+            <a:r>
+              <a:rPr lang="en-US" kern="50" dirty="0">
+                <a:latin typeface="Times New Roman" panose="02020603050405020304" pitchFamily="18" charset="0"/>
+                <a:ea typeface="Arial Unicode MS" panose="020B0604020202020204" pitchFamily="34" charset="-128"/>
+              </a:rPr>
+              <a:t> </a:t>
+            </a:r>
+            <a:r>
+              <a:rPr lang="en-US" kern="50" dirty="0" err="1">
+                <a:latin typeface="Times New Roman" panose="02020603050405020304" pitchFamily="18" charset="0"/>
+                <a:ea typeface="Arial Unicode MS" panose="020B0604020202020204" pitchFamily="34" charset="-128"/>
+              </a:rPr>
+              <a:t>listesine</a:t>
+            </a:r>
+            <a:r>
+              <a:rPr lang="en-US" kern="50" dirty="0">
+                <a:latin typeface="Times New Roman" panose="02020603050405020304" pitchFamily="18" charset="0"/>
+                <a:ea typeface="Arial Unicode MS" panose="020B0604020202020204" pitchFamily="34" charset="-128"/>
+              </a:rPr>
+              <a:t> </a:t>
+            </a:r>
+            <a:r>
+              <a:rPr lang="en-US" kern="50" dirty="0" err="1">
+                <a:latin typeface="Times New Roman" panose="02020603050405020304" pitchFamily="18" charset="0"/>
+                <a:ea typeface="Arial Unicode MS" panose="020B0604020202020204" pitchFamily="34" charset="-128"/>
+              </a:rPr>
+              <a:t>ekleyecektir</a:t>
+            </a:r>
+            <a:r>
+              <a:rPr lang="en-US" kern="50" dirty="0" smtClean="0">
+                <a:latin typeface="Times New Roman" panose="02020603050405020304" pitchFamily="18" charset="0"/>
+                <a:ea typeface="Arial Unicode MS" panose="020B0604020202020204" pitchFamily="34" charset="-128"/>
+              </a:rPr>
+              <a:t>.</a:t>
+            </a:r>
+            <a:endParaRPr lang="tr-TR" kern="50" dirty="0" smtClean="0">
               <a:latin typeface="Times New Roman" panose="02020603050405020304" pitchFamily="18" charset="0"/>
               <a:ea typeface="Arial Unicode MS" panose="020B0604020202020204" pitchFamily="34" charset="-128"/>
             </a:endParaRPr>
@@ -11395,93 +12119,381 @@
                 <a:spcPts val="600"/>
               </a:spcAft>
             </a:pPr>
-            <a:r>
-              <a:rPr lang="tr-TR" kern="50" smtClean="0">
-                <a:effectLst/>
-                <a:latin typeface="Times New Roman" panose="02020603050405020304" pitchFamily="18" charset="0"/>
-                <a:ea typeface="Arial Unicode MS" panose="020B0604020202020204" pitchFamily="34" charset="-128"/>
-              </a:rPr>
-              <a:t>Kurulacak sistemin avantajlarının yanısıra geliştirilmesi için uzman ve analist tutulması, personelin eğitilmesi, sistemin gelişimi için yapılacak ek harcamalar maliyeti artıran etkilerdi. </a:t>
-            </a:r>
-            <a:r>
-              <a:rPr lang="tr-TR" kern="50" dirty="0" smtClean="0">
-                <a:effectLst/>
-                <a:latin typeface="Times New Roman" panose="02020603050405020304" pitchFamily="18" charset="0"/>
-                <a:ea typeface="Arial Unicode MS" panose="020B0604020202020204" pitchFamily="34" charset="-128"/>
-              </a:rPr>
-              <a:t>Bu konuda fizibilite raporlarının incelenmesi sonucu maliyete rağmen geçmenin daha avantajlı olacağı fikrine varıldı. </a:t>
-            </a:r>
-            <a:endParaRPr lang="en-US" kern="50" smtClean="0">
+            <a:endParaRPr lang="tr-TR" kern="50" dirty="0">
               <a:effectLst/>
               <a:latin typeface="Times New Roman" panose="02020603050405020304" pitchFamily="18" charset="0"/>
               <a:ea typeface="Arial Unicode MS" panose="020B0604020202020204" pitchFamily="34" charset="-128"/>
             </a:endParaRPr>
           </a:p>
           <a:p>
-            <a:pPr algn="just">
+            <a:pPr indent="449580" algn="just">
               <a:spcAft>
                 <a:spcPts val="600"/>
               </a:spcAft>
             </a:pPr>
             <a:r>
-              <a:rPr lang="tr-TR" kern="50" smtClean="0">
-                <a:effectLst/>
-                <a:latin typeface="Times New Roman" panose="02020603050405020304" pitchFamily="18" charset="0"/>
-                <a:ea typeface="Arial Unicode MS" panose="020B0604020202020204" pitchFamily="34" charset="-128"/>
-              </a:rPr>
-              <a:t> </a:t>
-            </a:r>
-            <a:endParaRPr lang="en-US" kern="50" smtClean="0">
+              <a:rPr lang="tr-TR" kern="50" dirty="0" err="1">
+                <a:latin typeface="Times New Roman" panose="02020603050405020304" pitchFamily="18" charset="0"/>
+                <a:ea typeface="Arial Unicode MS" panose="020B0604020202020204" pitchFamily="34" charset="-128"/>
+              </a:rPr>
+              <a:t>Blog</a:t>
+            </a:r>
+            <a:r>
+              <a:rPr lang="tr-TR" kern="50" dirty="0">
+                <a:latin typeface="Times New Roman" panose="02020603050405020304" pitchFamily="18" charset="0"/>
+                <a:ea typeface="Arial Unicode MS" panose="020B0604020202020204" pitchFamily="34" charset="-128"/>
+              </a:rPr>
+              <a:t> yazarı olmanın diğer bir artısı da sayfa ziyaretçileriniz üzerinden elde edebileceğiniz gelirlerdir. Bu konudan ayrı bir başlık altında bahsedeceğimden şuan detaya girmiyorum</a:t>
+            </a:r>
+            <a:r>
+              <a:rPr lang="tr-TR" kern="50" dirty="0">
+                <a:latin typeface="Times New Roman" panose="02020603050405020304" pitchFamily="18" charset="0"/>
+                <a:ea typeface="Arial Unicode MS" panose="020B0604020202020204" pitchFamily="34" charset="-128"/>
+              </a:rPr>
+              <a:t>.</a:t>
+            </a:r>
+          </a:p>
+          <a:p>
+            <a:pPr indent="449580" algn="just">
+              <a:spcAft>
+                <a:spcPts val="600"/>
+              </a:spcAft>
+            </a:pPr>
+            <a:endParaRPr lang="tr-TR" kern="50" dirty="0">
               <a:effectLst/>
               <a:latin typeface="Times New Roman" panose="02020603050405020304" pitchFamily="18" charset="0"/>
               <a:ea typeface="Arial Unicode MS" panose="020B0604020202020204" pitchFamily="34" charset="-128"/>
             </a:endParaRPr>
           </a:p>
           <a:p>
-            <a:pPr algn="just">
+            <a:pPr indent="449580" algn="just">
               <a:spcAft>
                 <a:spcPts val="600"/>
               </a:spcAft>
             </a:pPr>
             <a:r>
-              <a:rPr lang="tr-TR" kern="50" smtClean="0">
-                <a:effectLst/>
-                <a:latin typeface="Times New Roman" panose="02020603050405020304" pitchFamily="18" charset="0"/>
-                <a:ea typeface="Arial Unicode MS" panose="020B0604020202020204" pitchFamily="34" charset="-128"/>
-              </a:rPr>
-              <a:t>Yeni sisteme geçişte bir miktar maliyet artışı olsa da stokların düzenli ve kolay kontrolü, lojistik desteğinde ve depolarda verimliliğin artması, müşteri memnuniyetiyle mevcut müşteri sayısının artması ile gelir miktarında artış olur ve kâr artacaktır.</a:t>
-            </a:r>
-            <a:endParaRPr lang="en-US" kern="50" smtClean="0">
-              <a:effectLst/>
-              <a:latin typeface="Times New Roman" panose="02020603050405020304" pitchFamily="18" charset="0"/>
-              <a:ea typeface="Arial Unicode MS" panose="020B0604020202020204" pitchFamily="34" charset="-128"/>
-            </a:endParaRPr>
-          </a:p>
-          <a:p>
-            <a:r>
-              <a:rPr lang="tr-TR" kern="50" smtClean="0">
-                <a:effectLst/>
-                <a:latin typeface="Times New Roman" panose="02020603050405020304" pitchFamily="18" charset="0"/>
-                <a:ea typeface="Arial Unicode MS" panose="020B0604020202020204" pitchFamily="34" charset="-128"/>
-              </a:rPr>
-              <a:t> </a:t>
-            </a:r>
-            <a:endParaRPr lang="en-US" kern="50" smtClean="0">
-              <a:effectLst/>
-              <a:latin typeface="Times New Roman" panose="02020603050405020304" pitchFamily="18" charset="0"/>
-              <a:ea typeface="Arial Unicode MS" panose="020B0604020202020204" pitchFamily="34" charset="-128"/>
-            </a:endParaRPr>
-          </a:p>
-          <a:p>
-            <a:r>
-              <a:rPr lang="tr-TR" kern="50" smtClean="0">
-                <a:effectLst/>
-                <a:latin typeface="Times New Roman" panose="02020603050405020304" pitchFamily="18" charset="0"/>
-                <a:ea typeface="Arial Unicode MS" panose="020B0604020202020204" pitchFamily="34" charset="-128"/>
-              </a:rPr>
-              <a:t> </a:t>
-            </a:r>
-            <a:endParaRPr lang="en-US" kern="50">
+              <a:rPr lang="en-US" kern="50" dirty="0" err="1">
+                <a:latin typeface="Times New Roman" panose="02020603050405020304" pitchFamily="18" charset="0"/>
+                <a:ea typeface="Arial Unicode MS" panose="020B0604020202020204" pitchFamily="34" charset="-128"/>
+              </a:rPr>
+              <a:t>Tüm</a:t>
+            </a:r>
+            <a:r>
+              <a:rPr lang="en-US" kern="50" dirty="0">
+                <a:latin typeface="Times New Roman" panose="02020603050405020304" pitchFamily="18" charset="0"/>
+                <a:ea typeface="Arial Unicode MS" panose="020B0604020202020204" pitchFamily="34" charset="-128"/>
+              </a:rPr>
+              <a:t> </a:t>
+            </a:r>
+            <a:r>
+              <a:rPr lang="en-US" kern="50" dirty="0" err="1">
+                <a:latin typeface="Times New Roman" panose="02020603050405020304" pitchFamily="18" charset="0"/>
+                <a:ea typeface="Arial Unicode MS" panose="020B0604020202020204" pitchFamily="34" charset="-128"/>
+              </a:rPr>
+              <a:t>bunların</a:t>
+            </a:r>
+            <a:r>
+              <a:rPr lang="en-US" kern="50" dirty="0">
+                <a:latin typeface="Times New Roman" panose="02020603050405020304" pitchFamily="18" charset="0"/>
+                <a:ea typeface="Arial Unicode MS" panose="020B0604020202020204" pitchFamily="34" charset="-128"/>
+              </a:rPr>
+              <a:t> </a:t>
+            </a:r>
+            <a:r>
+              <a:rPr lang="en-US" kern="50" dirty="0" err="1">
+                <a:latin typeface="Times New Roman" panose="02020603050405020304" pitchFamily="18" charset="0"/>
+                <a:ea typeface="Arial Unicode MS" panose="020B0604020202020204" pitchFamily="34" charset="-128"/>
+              </a:rPr>
+              <a:t>dışında</a:t>
+            </a:r>
+            <a:r>
+              <a:rPr lang="en-US" kern="50" dirty="0">
+                <a:latin typeface="Times New Roman" panose="02020603050405020304" pitchFamily="18" charset="0"/>
+                <a:ea typeface="Arial Unicode MS" panose="020B0604020202020204" pitchFamily="34" charset="-128"/>
+              </a:rPr>
+              <a:t> blog </a:t>
+            </a:r>
+            <a:r>
+              <a:rPr lang="en-US" kern="50" dirty="0" err="1">
+                <a:latin typeface="Times New Roman" panose="02020603050405020304" pitchFamily="18" charset="0"/>
+                <a:ea typeface="Arial Unicode MS" panose="020B0604020202020204" pitchFamily="34" charset="-128"/>
+              </a:rPr>
+              <a:t>sayfanızın</a:t>
+            </a:r>
+            <a:r>
+              <a:rPr lang="en-US" kern="50" dirty="0">
+                <a:latin typeface="Times New Roman" panose="02020603050405020304" pitchFamily="18" charset="0"/>
+                <a:ea typeface="Arial Unicode MS" panose="020B0604020202020204" pitchFamily="34" charset="-128"/>
+              </a:rPr>
+              <a:t> </a:t>
+            </a:r>
+            <a:r>
+              <a:rPr lang="en-US" kern="50" dirty="0" err="1">
+                <a:latin typeface="Times New Roman" panose="02020603050405020304" pitchFamily="18" charset="0"/>
+                <a:ea typeface="Arial Unicode MS" panose="020B0604020202020204" pitchFamily="34" charset="-128"/>
+              </a:rPr>
+              <a:t>kişisel</a:t>
+            </a:r>
+            <a:r>
+              <a:rPr lang="en-US" kern="50" dirty="0">
+                <a:latin typeface="Times New Roman" panose="02020603050405020304" pitchFamily="18" charset="0"/>
+                <a:ea typeface="Arial Unicode MS" panose="020B0604020202020204" pitchFamily="34" charset="-128"/>
+              </a:rPr>
+              <a:t> </a:t>
+            </a:r>
+            <a:r>
+              <a:rPr lang="en-US" kern="50" dirty="0" err="1">
+                <a:latin typeface="Times New Roman" panose="02020603050405020304" pitchFamily="18" charset="0"/>
+                <a:ea typeface="Arial Unicode MS" panose="020B0604020202020204" pitchFamily="34" charset="-128"/>
+              </a:rPr>
+              <a:t>gelişiminize</a:t>
+            </a:r>
+            <a:r>
+              <a:rPr lang="en-US" kern="50" dirty="0">
+                <a:latin typeface="Times New Roman" panose="02020603050405020304" pitchFamily="18" charset="0"/>
+                <a:ea typeface="Arial Unicode MS" panose="020B0604020202020204" pitchFamily="34" charset="-128"/>
+              </a:rPr>
+              <a:t> de </a:t>
+            </a:r>
+            <a:r>
+              <a:rPr lang="en-US" kern="50" dirty="0" err="1">
+                <a:latin typeface="Times New Roman" panose="02020603050405020304" pitchFamily="18" charset="0"/>
+                <a:ea typeface="Arial Unicode MS" panose="020B0604020202020204" pitchFamily="34" charset="-128"/>
+              </a:rPr>
+              <a:t>etkisinin</a:t>
+            </a:r>
+            <a:r>
+              <a:rPr lang="en-US" kern="50" dirty="0">
+                <a:latin typeface="Times New Roman" panose="02020603050405020304" pitchFamily="18" charset="0"/>
+                <a:ea typeface="Arial Unicode MS" panose="020B0604020202020204" pitchFamily="34" charset="-128"/>
+              </a:rPr>
+              <a:t> </a:t>
+            </a:r>
+            <a:r>
+              <a:rPr lang="en-US" kern="50" dirty="0" err="1">
+                <a:latin typeface="Times New Roman" panose="02020603050405020304" pitchFamily="18" charset="0"/>
+                <a:ea typeface="Arial Unicode MS" panose="020B0604020202020204" pitchFamily="34" charset="-128"/>
+              </a:rPr>
+              <a:t>büyük</a:t>
+            </a:r>
+            <a:r>
+              <a:rPr lang="en-US" kern="50" dirty="0">
+                <a:latin typeface="Times New Roman" panose="02020603050405020304" pitchFamily="18" charset="0"/>
+                <a:ea typeface="Arial Unicode MS" panose="020B0604020202020204" pitchFamily="34" charset="-128"/>
+              </a:rPr>
+              <a:t> </a:t>
+            </a:r>
+            <a:r>
+              <a:rPr lang="en-US" kern="50" dirty="0" err="1">
+                <a:latin typeface="Times New Roman" panose="02020603050405020304" pitchFamily="18" charset="0"/>
+                <a:ea typeface="Arial Unicode MS" panose="020B0604020202020204" pitchFamily="34" charset="-128"/>
+              </a:rPr>
+              <a:t>olduğunu</a:t>
+            </a:r>
+            <a:r>
+              <a:rPr lang="en-US" kern="50" dirty="0">
+                <a:latin typeface="Times New Roman" panose="02020603050405020304" pitchFamily="18" charset="0"/>
+                <a:ea typeface="Arial Unicode MS" panose="020B0604020202020204" pitchFamily="34" charset="-128"/>
+              </a:rPr>
+              <a:t> </a:t>
+            </a:r>
+            <a:r>
+              <a:rPr lang="en-US" kern="50" dirty="0" err="1">
+                <a:latin typeface="Times New Roman" panose="02020603050405020304" pitchFamily="18" charset="0"/>
+                <a:ea typeface="Arial Unicode MS" panose="020B0604020202020204" pitchFamily="34" charset="-128"/>
+              </a:rPr>
+              <a:t>söyleyebilirim</a:t>
+            </a:r>
+            <a:r>
+              <a:rPr lang="en-US" kern="50" dirty="0">
+                <a:latin typeface="Times New Roman" panose="02020603050405020304" pitchFamily="18" charset="0"/>
+                <a:ea typeface="Arial Unicode MS" panose="020B0604020202020204" pitchFamily="34" charset="-128"/>
+              </a:rPr>
+              <a:t>. Blog </a:t>
+            </a:r>
+            <a:r>
+              <a:rPr lang="en-US" kern="50" dirty="0" err="1">
+                <a:latin typeface="Times New Roman" panose="02020603050405020304" pitchFamily="18" charset="0"/>
+                <a:ea typeface="Arial Unicode MS" panose="020B0604020202020204" pitchFamily="34" charset="-128"/>
+              </a:rPr>
+              <a:t>yazmanın</a:t>
+            </a:r>
+            <a:r>
+              <a:rPr lang="en-US" kern="50" dirty="0">
+                <a:latin typeface="Times New Roman" panose="02020603050405020304" pitchFamily="18" charset="0"/>
+                <a:ea typeface="Arial Unicode MS" panose="020B0604020202020204" pitchFamily="34" charset="-128"/>
+              </a:rPr>
+              <a:t> </a:t>
+            </a:r>
+            <a:r>
+              <a:rPr lang="en-US" kern="50" dirty="0" err="1">
+                <a:latin typeface="Times New Roman" panose="02020603050405020304" pitchFamily="18" charset="0"/>
+                <a:ea typeface="Arial Unicode MS" panose="020B0604020202020204" pitchFamily="34" charset="-128"/>
+              </a:rPr>
+              <a:t>öz</a:t>
+            </a:r>
+            <a:r>
+              <a:rPr lang="en-US" kern="50" dirty="0">
+                <a:latin typeface="Times New Roman" panose="02020603050405020304" pitchFamily="18" charset="0"/>
+                <a:ea typeface="Arial Unicode MS" panose="020B0604020202020204" pitchFamily="34" charset="-128"/>
+              </a:rPr>
+              <a:t> </a:t>
+            </a:r>
+            <a:r>
+              <a:rPr lang="en-US" kern="50" dirty="0" err="1">
+                <a:latin typeface="Times New Roman" panose="02020603050405020304" pitchFamily="18" charset="0"/>
+                <a:ea typeface="Arial Unicode MS" panose="020B0604020202020204" pitchFamily="34" charset="-128"/>
+              </a:rPr>
+              <a:t>güven</a:t>
+            </a:r>
+            <a:r>
+              <a:rPr lang="en-US" kern="50" dirty="0">
+                <a:latin typeface="Times New Roman" panose="02020603050405020304" pitchFamily="18" charset="0"/>
+                <a:ea typeface="Arial Unicode MS" panose="020B0604020202020204" pitchFamily="34" charset="-128"/>
+              </a:rPr>
+              <a:t> </a:t>
+            </a:r>
+            <a:r>
+              <a:rPr lang="en-US" kern="50" dirty="0" err="1">
+                <a:latin typeface="Times New Roman" panose="02020603050405020304" pitchFamily="18" charset="0"/>
+                <a:ea typeface="Arial Unicode MS" panose="020B0604020202020204" pitchFamily="34" charset="-128"/>
+              </a:rPr>
+              <a:t>ve</a:t>
+            </a:r>
+            <a:r>
+              <a:rPr lang="en-US" kern="50" dirty="0">
+                <a:latin typeface="Times New Roman" panose="02020603050405020304" pitchFamily="18" charset="0"/>
+                <a:ea typeface="Arial Unicode MS" panose="020B0604020202020204" pitchFamily="34" charset="-128"/>
+              </a:rPr>
+              <a:t> </a:t>
+            </a:r>
+            <a:r>
+              <a:rPr lang="en-US" kern="50" dirty="0" err="1">
+                <a:latin typeface="Times New Roman" panose="02020603050405020304" pitchFamily="18" charset="0"/>
+                <a:ea typeface="Arial Unicode MS" panose="020B0604020202020204" pitchFamily="34" charset="-128"/>
+              </a:rPr>
+              <a:t>disiplin</a:t>
+            </a:r>
+            <a:r>
+              <a:rPr lang="en-US" kern="50" dirty="0">
+                <a:latin typeface="Times New Roman" panose="02020603050405020304" pitchFamily="18" charset="0"/>
+                <a:ea typeface="Arial Unicode MS" panose="020B0604020202020204" pitchFamily="34" charset="-128"/>
+              </a:rPr>
+              <a:t> </a:t>
+            </a:r>
+            <a:r>
+              <a:rPr lang="en-US" kern="50" dirty="0" err="1">
+                <a:latin typeface="Times New Roman" panose="02020603050405020304" pitchFamily="18" charset="0"/>
+                <a:ea typeface="Arial Unicode MS" panose="020B0604020202020204" pitchFamily="34" charset="-128"/>
+              </a:rPr>
+              <a:t>kazandırma</a:t>
+            </a:r>
+            <a:r>
+              <a:rPr lang="en-US" kern="50" dirty="0">
+                <a:latin typeface="Times New Roman" panose="02020603050405020304" pitchFamily="18" charset="0"/>
+                <a:ea typeface="Arial Unicode MS" panose="020B0604020202020204" pitchFamily="34" charset="-128"/>
+              </a:rPr>
+              <a:t> </a:t>
+            </a:r>
+            <a:r>
+              <a:rPr lang="en-US" kern="50" dirty="0" err="1">
+                <a:latin typeface="Times New Roman" panose="02020603050405020304" pitchFamily="18" charset="0"/>
+                <a:ea typeface="Arial Unicode MS" panose="020B0604020202020204" pitchFamily="34" charset="-128"/>
+              </a:rPr>
+              <a:t>gibi</a:t>
+            </a:r>
+            <a:r>
+              <a:rPr lang="en-US" kern="50" dirty="0">
+                <a:latin typeface="Times New Roman" panose="02020603050405020304" pitchFamily="18" charset="0"/>
+                <a:ea typeface="Arial Unicode MS" panose="020B0604020202020204" pitchFamily="34" charset="-128"/>
+              </a:rPr>
+              <a:t> </a:t>
+            </a:r>
+            <a:r>
+              <a:rPr lang="en-US" kern="50" dirty="0" err="1">
+                <a:latin typeface="Times New Roman" panose="02020603050405020304" pitchFamily="18" charset="0"/>
+                <a:ea typeface="Arial Unicode MS" panose="020B0604020202020204" pitchFamily="34" charset="-128"/>
+              </a:rPr>
+              <a:t>birçok</a:t>
+            </a:r>
+            <a:r>
+              <a:rPr lang="en-US" kern="50" dirty="0">
+                <a:latin typeface="Times New Roman" panose="02020603050405020304" pitchFamily="18" charset="0"/>
+                <a:ea typeface="Arial Unicode MS" panose="020B0604020202020204" pitchFamily="34" charset="-128"/>
+              </a:rPr>
+              <a:t> </a:t>
+            </a:r>
+            <a:r>
+              <a:rPr lang="en-US" kern="50" dirty="0" err="1">
+                <a:latin typeface="Times New Roman" panose="02020603050405020304" pitchFamily="18" charset="0"/>
+                <a:ea typeface="Arial Unicode MS" panose="020B0604020202020204" pitchFamily="34" charset="-128"/>
+              </a:rPr>
+              <a:t>kişisel</a:t>
+            </a:r>
+            <a:r>
+              <a:rPr lang="en-US" kern="50" dirty="0">
+                <a:latin typeface="Times New Roman" panose="02020603050405020304" pitchFamily="18" charset="0"/>
+                <a:ea typeface="Arial Unicode MS" panose="020B0604020202020204" pitchFamily="34" charset="-128"/>
+              </a:rPr>
+              <a:t> </a:t>
+            </a:r>
+            <a:r>
+              <a:rPr lang="en-US" kern="50" dirty="0" err="1">
+                <a:latin typeface="Times New Roman" panose="02020603050405020304" pitchFamily="18" charset="0"/>
+                <a:ea typeface="Arial Unicode MS" panose="020B0604020202020204" pitchFamily="34" charset="-128"/>
+              </a:rPr>
+              <a:t>faydası</a:t>
+            </a:r>
+            <a:r>
+              <a:rPr lang="en-US" kern="50" dirty="0">
+                <a:latin typeface="Times New Roman" panose="02020603050405020304" pitchFamily="18" charset="0"/>
+                <a:ea typeface="Arial Unicode MS" panose="020B0604020202020204" pitchFamily="34" charset="-128"/>
+              </a:rPr>
+              <a:t> </a:t>
+            </a:r>
+            <a:r>
+              <a:rPr lang="en-US" kern="50" dirty="0" err="1">
+                <a:latin typeface="Times New Roman" panose="02020603050405020304" pitchFamily="18" charset="0"/>
+                <a:ea typeface="Arial Unicode MS" panose="020B0604020202020204" pitchFamily="34" charset="-128"/>
+              </a:rPr>
+              <a:t>olduğundan</a:t>
+            </a:r>
+            <a:r>
+              <a:rPr lang="en-US" kern="50" dirty="0">
+                <a:latin typeface="Times New Roman" panose="02020603050405020304" pitchFamily="18" charset="0"/>
+                <a:ea typeface="Arial Unicode MS" panose="020B0604020202020204" pitchFamily="34" charset="-128"/>
+              </a:rPr>
+              <a:t> </a:t>
+            </a:r>
+            <a:r>
+              <a:rPr lang="en-US" kern="50" dirty="0" err="1">
+                <a:latin typeface="Times New Roman" panose="02020603050405020304" pitchFamily="18" charset="0"/>
+                <a:ea typeface="Arial Unicode MS" panose="020B0604020202020204" pitchFamily="34" charset="-128"/>
+              </a:rPr>
+              <a:t>emin</a:t>
+            </a:r>
+            <a:r>
+              <a:rPr lang="en-US" kern="50" dirty="0">
+                <a:latin typeface="Times New Roman" panose="02020603050405020304" pitchFamily="18" charset="0"/>
+                <a:ea typeface="Arial Unicode MS" panose="020B0604020202020204" pitchFamily="34" charset="-128"/>
+              </a:rPr>
+              <a:t> </a:t>
+            </a:r>
+            <a:r>
+              <a:rPr lang="en-US" kern="50" dirty="0" err="1">
+                <a:latin typeface="Times New Roman" panose="02020603050405020304" pitchFamily="18" charset="0"/>
+                <a:ea typeface="Arial Unicode MS" panose="020B0604020202020204" pitchFamily="34" charset="-128"/>
+              </a:rPr>
+              <a:t>olabilirsiniz</a:t>
+            </a:r>
+            <a:r>
+              <a:rPr lang="en-US" kern="50" dirty="0">
+                <a:latin typeface="Times New Roman" panose="02020603050405020304" pitchFamily="18" charset="0"/>
+                <a:ea typeface="Arial Unicode MS" panose="020B0604020202020204" pitchFamily="34" charset="-128"/>
+              </a:rPr>
+              <a:t>.</a:t>
+            </a:r>
+            <a:endParaRPr lang="en-US" kern="50" dirty="0">
               <a:effectLst/>
               <a:latin typeface="Times New Roman" panose="02020603050405020304" pitchFamily="18" charset="0"/>
               <a:ea typeface="Arial Unicode MS" panose="020B0604020202020204" pitchFamily="34" charset="-128"/>
@@ -11554,21 +12566,21 @@
                 <a:gridCol w="1133918">
                   <a:extLst>
                     <a:ext uri="{9D8B030D-6E8A-4147-A177-3AD203B41FA5}">
-                      <a16:colId xmlns:a16="http://schemas.microsoft.com/office/drawing/2014/main" xmlns="" val="20000"/>
+                      <a16:colId xmlns="" xmlns:a16="http://schemas.microsoft.com/office/drawing/2014/main" val="20000"/>
                     </a:ext>
                   </a:extLst>
                 </a:gridCol>
                 <a:gridCol w="2260549">
                   <a:extLst>
                     <a:ext uri="{9D8B030D-6E8A-4147-A177-3AD203B41FA5}">
-                      <a16:colId xmlns:a16="http://schemas.microsoft.com/office/drawing/2014/main" xmlns="" val="20001"/>
+                      <a16:colId xmlns="" xmlns:a16="http://schemas.microsoft.com/office/drawing/2014/main" val="20001"/>
                     </a:ext>
                   </a:extLst>
                 </a:gridCol>
                 <a:gridCol w="4705185">
                   <a:extLst>
                     <a:ext uri="{9D8B030D-6E8A-4147-A177-3AD203B41FA5}">
-                      <a16:colId xmlns:a16="http://schemas.microsoft.com/office/drawing/2014/main" xmlns="" val="20002"/>
+                      <a16:colId xmlns="" xmlns:a16="http://schemas.microsoft.com/office/drawing/2014/main" val="20002"/>
                     </a:ext>
                   </a:extLst>
                 </a:gridCol>
@@ -11670,7 +12682,7 @@
                 </a:tc>
                 <a:extLst>
                   <a:ext uri="{0D108BD9-81ED-4DB2-BD59-A6C34878D82A}">
-                    <a16:rowId xmlns:a16="http://schemas.microsoft.com/office/drawing/2014/main" xmlns="" val="10000"/>
+                    <a16:rowId xmlns="" xmlns:a16="http://schemas.microsoft.com/office/drawing/2014/main" val="10000"/>
                   </a:ext>
                 </a:extLst>
               </a:tr>
@@ -12124,7 +13136,7 @@
                 </a:tc>
                 <a:extLst>
                   <a:ext uri="{0D108BD9-81ED-4DB2-BD59-A6C34878D82A}">
-                    <a16:rowId xmlns:a16="http://schemas.microsoft.com/office/drawing/2014/main" xmlns="" val="10001"/>
+                    <a16:rowId xmlns="" xmlns:a16="http://schemas.microsoft.com/office/drawing/2014/main" val="10001"/>
                   </a:ext>
                 </a:extLst>
               </a:tr>
@@ -12203,7 +13215,7 @@
                 </a:tc>
                 <a:extLst>
                   <a:ext uri="{0D108BD9-81ED-4DB2-BD59-A6C34878D82A}">
-                    <a16:rowId xmlns:a16="http://schemas.microsoft.com/office/drawing/2014/main" xmlns="" val="10002"/>
+                    <a16:rowId xmlns="" xmlns:a16="http://schemas.microsoft.com/office/drawing/2014/main" val="10002"/>
                   </a:ext>
                 </a:extLst>
               </a:tr>
@@ -12294,7 +13306,7 @@
                 </a:tc>
                 <a:extLst>
                   <a:ext uri="{0D108BD9-81ED-4DB2-BD59-A6C34878D82A}">
-                    <a16:rowId xmlns:a16="http://schemas.microsoft.com/office/drawing/2014/main" xmlns="" val="10003"/>
+                    <a16:rowId xmlns="" xmlns:a16="http://schemas.microsoft.com/office/drawing/2014/main" val="10003"/>
                   </a:ext>
                 </a:extLst>
               </a:tr>
@@ -14086,7 +15098,7 @@
   <a:extraClrSchemeLst/>
   <a:extLst>
     <a:ext uri="{05A4C25C-085E-4340-85A3-A5531E510DB2}">
-      <thm15:themeFamily xmlns:thm15="http://schemas.microsoft.com/office/thememl/2012/main" xmlns="" name="Ion" id="{B8441ADB-2E43-4AF7-B97A-BD870242C6A8}" vid="{A207AED3-9ABC-4A18-9978-A59B65688B15}"/>
+      <thm15:themeFamily xmlns="" xmlns:thm15="http://schemas.microsoft.com/office/thememl/2012/main" name="Ion" id="{B8441ADB-2E43-4AF7-B97A-BD870242C6A8}" vid="{A207AED3-9ABC-4A18-9978-A59B65688B15}"/>
     </a:ext>
   </a:extLst>
 </a:theme>

</xml_diff>